<commit_message>
Agenda mechanisms - second example
</commit_message>
<xml_diff>
--- a/drools-business-rules-engine.pptx
+++ b/drools-business-rules-engine.pptx
@@ -29,8 +29,8 @@
     <p:sldId id="266" r:id="rId21"/>
     <p:sldId id="267" r:id="rId22"/>
     <p:sldId id="259" r:id="rId23"/>
-    <p:sldId id="271" r:id="rId24"/>
-    <p:sldId id="288" r:id="rId25"/>
+    <p:sldId id="288" r:id="rId24"/>
+    <p:sldId id="271" r:id="rId25"/>
     <p:sldId id="275" r:id="rId26"/>
     <p:sldId id="276" r:id="rId27"/>
     <p:sldId id="268" r:id="rId28"/>
@@ -237,7 +237,7 @@
             <a:fld id="{3842907C-D0AA-4C58-9F94-58B40AD65B29}" type="datetimeFigureOut">
               <a:rPr lang="en-US" smtClean="0"/>
               <a:pPr/>
-              <a:t>2/4/2014</a:t>
+              <a:t>2/5/2014</a:t>
             </a:fld>
             <a:endParaRPr lang="en-US"/>
           </a:p>
@@ -1222,7 +1222,7 @@
             <a:fld id="{E6E13C79-1C97-4B32-B2AE-1A69C169643E}" type="datetime2">
               <a:rPr lang="en-US" smtClean="0"/>
               <a:pPr/>
-              <a:t>Tuesday, February 04, 2014</a:t>
+              <a:t>Wednesday, February 05, 2014</a:t>
             </a:fld>
             <a:endParaRPr lang="en-US" dirty="0">
               <a:solidFill>
@@ -1434,7 +1434,7 @@
             <a:fld id="{D10E14BF-C004-4398-9186-5EE680724D95}" type="datetime2">
               <a:rPr lang="en-US" smtClean="0"/>
               <a:pPr/>
-              <a:t>Tuesday, February 04, 2014</a:t>
+              <a:t>Wednesday, February 05, 2014</a:t>
             </a:fld>
             <a:endParaRPr lang="en-US"/>
           </a:p>
@@ -1627,7 +1627,7 @@
             <a:fld id="{D10E14BF-C004-4398-9186-5EE680724D95}" type="datetime2">
               <a:rPr lang="en-US" smtClean="0"/>
               <a:pPr/>
-              <a:t>Tuesday, February 04, 2014</a:t>
+              <a:t>Wednesday, February 05, 2014</a:t>
             </a:fld>
             <a:endParaRPr lang="en-US"/>
           </a:p>
@@ -1785,7 +1785,7 @@
             <a:fld id="{227FEF5B-F2CC-4EC5-8F1F-29A8BF9EFFA9}" type="datetime2">
               <a:rPr lang="en-US" smtClean="0"/>
               <a:pPr/>
-              <a:t>Tuesday, February 04, 2014</a:t>
+              <a:t>Wednesday, February 05, 2014</a:t>
             </a:fld>
             <a:endParaRPr lang="en-US"/>
           </a:p>
@@ -2042,7 +2042,7 @@
             <a:fld id="{5F4709C1-563D-4D9C-B702-B64C84A5A174}" type="datetime2">
               <a:rPr lang="en-US" smtClean="0"/>
               <a:pPr/>
-              <a:t>Tuesday, February 04, 2014</a:t>
+              <a:t>Wednesday, February 05, 2014</a:t>
             </a:fld>
             <a:endParaRPr lang="en-US"/>
           </a:p>
@@ -2453,7 +2453,7 @@
             <a:fld id="{2E8303D9-A6EB-41FB-BF22-3F49E470997E}" type="datetime2">
               <a:rPr lang="en-US" smtClean="0"/>
               <a:pPr/>
-              <a:t>Tuesday, February 04, 2014</a:t>
+              <a:t>Wednesday, February 05, 2014</a:t>
             </a:fld>
             <a:endParaRPr lang="en-US"/>
           </a:p>
@@ -2901,7 +2901,7 @@
             <a:fld id="{89BB0534-5698-4F62-9CFE-5DE61A073E78}" type="datetime2">
               <a:rPr lang="en-US" smtClean="0"/>
               <a:pPr/>
-              <a:t>Tuesday, February 04, 2014</a:t>
+              <a:t>Wednesday, February 05, 2014</a:t>
             </a:fld>
             <a:endParaRPr lang="en-US"/>
           </a:p>
@@ -3004,7 +3004,7 @@
             <a:fld id="{084827A3-B249-4F87-AB1A-1E06AC1AA2A4}" type="datetime2">
               <a:rPr lang="en-US" smtClean="0"/>
               <a:pPr/>
-              <a:t>Tuesday, February 04, 2014</a:t>
+              <a:t>Wednesday, February 05, 2014</a:t>
             </a:fld>
             <a:endParaRPr lang="en-US"/>
           </a:p>
@@ -3127,7 +3127,7 @@
             <a:fld id="{B1546142-29B2-49CC-BCC6-A3AD70B4960E}" type="datetime2">
               <a:rPr lang="en-US" smtClean="0"/>
               <a:pPr/>
-              <a:t>Tuesday, February 04, 2014</a:t>
+              <a:t>Wednesday, February 05, 2014</a:t>
             </a:fld>
             <a:endParaRPr lang="en-US"/>
           </a:p>
@@ -3403,7 +3403,7 @@
             <a:fld id="{E86C4691-4882-40A8-AF62-8CF6A18D40B2}" type="datetime2">
               <a:rPr lang="en-US" smtClean="0"/>
               <a:pPr/>
-              <a:t>Tuesday, February 04, 2014</a:t>
+              <a:t>Wednesday, February 05, 2014</a:t>
             </a:fld>
             <a:endParaRPr lang="en-US"/>
           </a:p>
@@ -3610,7 +3610,7 @@
             <a:fld id="{61C6776A-4DEC-47EE-8A49-2C150ECB5465}" type="datetime2">
               <a:rPr lang="en-US" smtClean="0"/>
               <a:pPr/>
-              <a:t>Tuesday, February 04, 2014</a:t>
+              <a:t>Wednesday, February 05, 2014</a:t>
             </a:fld>
             <a:endParaRPr lang="en-US">
               <a:solidFill>
@@ -4733,7 +4733,7 @@
             <a:fld id="{D10E14BF-C004-4398-9186-5EE680724D95}" type="datetime2">
               <a:rPr lang="en-US" smtClean="0"/>
               <a:pPr/>
-              <a:t>Tuesday, February 04, 2014</a:t>
+              <a:t>Wednesday, February 05, 2014</a:t>
             </a:fld>
             <a:endParaRPr lang="en-US" sz="1000" dirty="0">
               <a:solidFill>
@@ -7765,7 +7765,6 @@
               <a:rPr lang="pl-PL" sz="2400" dirty="0"/>
               <a:t>));</a:t>
             </a:r>
-            <a:endParaRPr lang="pl-PL" sz="2400" dirty="0"/>
           </a:p>
         </p:txBody>
       </p:sp>
@@ -8217,45 +8216,140 @@
         </p:nvSpPr>
         <p:spPr/>
         <p:txBody>
-          <a:bodyPr>
-            <a:normAutofit/>
-          </a:bodyPr>
-          <a:lstStyle/>
-          <a:p>
-            <a:pPr marL="109728" indent="0">
-              <a:buNone/>
-            </a:pPr>
-            <a:endParaRPr lang="pl-PL" sz="1400" dirty="0"/>
-          </a:p>
-        </p:txBody>
-      </p:sp>
-      <p:sp>
-        <p:nvSpPr>
-          <p:cNvPr id="3" name="Tytuł 2"/>
-          <p:cNvSpPr>
-            <a:spLocks noGrp="1"/>
-          </p:cNvSpPr>
-          <p:nvPr>
-            <p:ph type="title"/>
-          </p:nvPr>
-        </p:nvSpPr>
-        <p:spPr/>
-        <p:txBody>
           <a:bodyPr/>
           <a:lstStyle/>
           <a:p>
             <a:r>
               <a:rPr lang="pl-PL" dirty="0" smtClean="0"/>
-              <a:t>kmodule.xml</a:t>
-            </a:r>
-            <a:endParaRPr lang="pl-PL" dirty="0"/>
+              <a:t>Agenda – </a:t>
+            </a:r>
+            <a:r>
+              <a:rPr lang="pl-PL" dirty="0" err="1" smtClean="0"/>
+              <a:t>defines</a:t>
+            </a:r>
+            <a:r>
+              <a:rPr lang="pl-PL" dirty="0" smtClean="0"/>
+              <a:t> </a:t>
+            </a:r>
+            <a:r>
+              <a:rPr lang="pl-PL" dirty="0" err="1" smtClean="0"/>
+              <a:t>an</a:t>
+            </a:r>
+            <a:r>
+              <a:rPr lang="pl-PL" dirty="0" smtClean="0"/>
+              <a:t> order of </a:t>
+            </a:r>
+            <a:r>
+              <a:rPr lang="pl-PL" dirty="0" err="1" smtClean="0"/>
+              <a:t>rules</a:t>
+            </a:r>
+            <a:r>
+              <a:rPr lang="pl-PL" dirty="0" smtClean="0"/>
+              <a:t> </a:t>
+            </a:r>
+            <a:r>
+              <a:rPr lang="pl-PL" dirty="0" err="1" smtClean="0"/>
+              <a:t>execution</a:t>
+            </a:r>
+            <a:endParaRPr lang="pl-PL" dirty="0" smtClean="0"/>
+          </a:p>
+          <a:p>
+            <a:pPr lvl="1"/>
+            <a:r>
+              <a:rPr lang="pl-PL" dirty="0" err="1" smtClean="0"/>
+              <a:t>Salience</a:t>
+            </a:r>
+            <a:endParaRPr lang="pl-PL" dirty="0" smtClean="0"/>
+          </a:p>
+          <a:p>
+            <a:pPr lvl="1"/>
+            <a:r>
+              <a:rPr lang="pl-PL" dirty="0" smtClean="0"/>
+              <a:t>Agenda </a:t>
+            </a:r>
+            <a:r>
+              <a:rPr lang="pl-PL" dirty="0" err="1" smtClean="0"/>
+              <a:t>groups</a:t>
+            </a:r>
+            <a:endParaRPr lang="pl-PL" dirty="0" smtClean="0"/>
+          </a:p>
+          <a:p>
+            <a:pPr lvl="1"/>
+            <a:r>
+              <a:rPr lang="pl-PL" dirty="0" err="1" smtClean="0"/>
+              <a:t>Activation</a:t>
+            </a:r>
+            <a:r>
+              <a:rPr lang="pl-PL" dirty="0" smtClean="0"/>
+              <a:t> </a:t>
+            </a:r>
+            <a:r>
+              <a:rPr lang="pl-PL" dirty="0" err="1" smtClean="0"/>
+              <a:t>groups</a:t>
+            </a:r>
+            <a:endParaRPr lang="pl-PL" dirty="0" smtClean="0"/>
+          </a:p>
+          <a:p>
+            <a:pPr lvl="1"/>
+            <a:r>
+              <a:rPr lang="pl-PL" dirty="0" err="1" smtClean="0"/>
+              <a:t>Rule</a:t>
+            </a:r>
+            <a:r>
+              <a:rPr lang="pl-PL" dirty="0" smtClean="0"/>
+              <a:t> </a:t>
+            </a:r>
+            <a:r>
+              <a:rPr lang="pl-PL" dirty="0" err="1" smtClean="0"/>
+              <a:t>flow</a:t>
+            </a:r>
+            <a:r>
+              <a:rPr lang="pl-PL" dirty="0" smtClean="0"/>
+              <a:t> </a:t>
+            </a:r>
+            <a:r>
+              <a:rPr lang="pl-PL" dirty="0" err="1" smtClean="0"/>
+              <a:t>groups</a:t>
+            </a:r>
+            <a:endParaRPr lang="en-GB" dirty="0"/>
+          </a:p>
+        </p:txBody>
+      </p:sp>
+      <p:sp>
+        <p:nvSpPr>
+          <p:cNvPr id="3" name="Tytuł 2"/>
+          <p:cNvSpPr>
+            <a:spLocks noGrp="1"/>
+          </p:cNvSpPr>
+          <p:nvPr>
+            <p:ph type="title"/>
+          </p:nvPr>
+        </p:nvSpPr>
+        <p:spPr/>
+        <p:txBody>
+          <a:bodyPr/>
+          <a:lstStyle/>
+          <a:p>
+            <a:r>
+              <a:rPr lang="pl-PL" dirty="0" err="1" smtClean="0"/>
+              <a:t>Execution</a:t>
+            </a:r>
+            <a:r>
+              <a:rPr lang="pl-PL" dirty="0" smtClean="0"/>
+              <a:t> </a:t>
+            </a:r>
+            <a:r>
+              <a:rPr lang="pl-PL" dirty="0" err="1" smtClean="0"/>
+              <a:t>control</a:t>
+            </a:r>
+            <a:endParaRPr lang="en-GB" dirty="0"/>
           </a:p>
         </p:txBody>
       </p:sp>
     </p:spTree>
     <p:extLst>
       <p:ext uri="{BB962C8B-B14F-4D97-AF65-F5344CB8AC3E}">
-        <p14:creationId xmlns:p14="http://schemas.microsoft.com/office/powerpoint/2010/main" val="2797506274"/>
+        <p14:creationId xmlns:p14="http://schemas.microsoft.com/office/powerpoint/2010/main" val="3875026567"/>
       </p:ext>
     </p:extLst>
   </p:cSld>
@@ -8301,52 +8395,45 @@
         </p:nvSpPr>
         <p:spPr/>
         <p:txBody>
+          <a:bodyPr>
+            <a:normAutofit/>
+          </a:bodyPr>
+          <a:lstStyle/>
+          <a:p>
+            <a:pPr marL="109728" indent="0">
+              <a:buNone/>
+            </a:pPr>
+            <a:endParaRPr lang="pl-PL" sz="1400" dirty="0"/>
+          </a:p>
+        </p:txBody>
+      </p:sp>
+      <p:sp>
+        <p:nvSpPr>
+          <p:cNvPr id="3" name="Tytuł 2"/>
+          <p:cNvSpPr>
+            <a:spLocks noGrp="1"/>
+          </p:cNvSpPr>
+          <p:nvPr>
+            <p:ph type="title"/>
+          </p:nvPr>
+        </p:nvSpPr>
+        <p:spPr/>
+        <p:txBody>
           <a:bodyPr/>
           <a:lstStyle/>
           <a:p>
             <a:r>
               <a:rPr lang="pl-PL" dirty="0" smtClean="0"/>
-              <a:t>Agenda</a:t>
-            </a:r>
-            <a:endParaRPr lang="en-GB" dirty="0"/>
-          </a:p>
-        </p:txBody>
-      </p:sp>
-      <p:sp>
-        <p:nvSpPr>
-          <p:cNvPr id="3" name="Tytuł 2"/>
-          <p:cNvSpPr>
-            <a:spLocks noGrp="1"/>
-          </p:cNvSpPr>
-          <p:nvPr>
-            <p:ph type="title"/>
-          </p:nvPr>
-        </p:nvSpPr>
-        <p:spPr/>
-        <p:txBody>
-          <a:bodyPr/>
-          <a:lstStyle/>
-          <a:p>
-            <a:r>
-              <a:rPr lang="pl-PL" dirty="0" err="1" smtClean="0"/>
-              <a:t>Execution</a:t>
-            </a:r>
-            <a:r>
-              <a:rPr lang="pl-PL" dirty="0" smtClean="0"/>
-              <a:t> </a:t>
-            </a:r>
-            <a:r>
-              <a:rPr lang="pl-PL" dirty="0" err="1" smtClean="0"/>
-              <a:t>control</a:t>
-            </a:r>
-            <a:endParaRPr lang="en-GB" dirty="0"/>
+              <a:t>kmodule.xml</a:t>
+            </a:r>
+            <a:endParaRPr lang="pl-PL" dirty="0"/>
           </a:p>
         </p:txBody>
       </p:sp>
     </p:spTree>
     <p:extLst>
       <p:ext uri="{BB962C8B-B14F-4D97-AF65-F5344CB8AC3E}">
-        <p14:creationId xmlns:p14="http://schemas.microsoft.com/office/powerpoint/2010/main" val="3875026567"/>
+        <p14:creationId xmlns:p14="http://schemas.microsoft.com/office/powerpoint/2010/main" val="2797506274"/>
       </p:ext>
     </p:extLst>
   </p:cSld>
@@ -10569,7 +10656,6 @@
               <a:rPr lang="pl-PL" dirty="0" smtClean="0"/>
               <a:t> - OWL</a:t>
             </a:r>
-            <a:endParaRPr lang="pl-PL" dirty="0" smtClean="0"/>
           </a:p>
           <a:p>
             <a:r>
@@ -11710,14 +11796,14 @@
           </a:p>
           <a:p>
             <a:r>
-              <a:rPr lang="pl-PL" dirty="0" err="1" smtClean="0"/>
+              <a:rPr lang="pl-PL" b="1" u="sng" dirty="0" err="1" smtClean="0"/>
               <a:t>ReteOO</a:t>
             </a:r>
-            <a:endParaRPr lang="pl-PL" dirty="0" smtClean="0"/>
-          </a:p>
-          <a:p>
-            <a:r>
-              <a:rPr lang="pl-PL" dirty="0" smtClean="0"/>
+            <a:endParaRPr lang="pl-PL" b="1" u="sng" dirty="0" smtClean="0"/>
+          </a:p>
+          <a:p>
+            <a:r>
+              <a:rPr lang="pl-PL" b="1" u="sng" dirty="0" smtClean="0"/>
               <a:t>PHREAK</a:t>
             </a:r>
           </a:p>

</xml_diff>

<commit_message>
Third example with DSL and presentation finished. Some warnings in code removed.
</commit_message>
<xml_diff>
--- a/drools-business-rules-engine.pptx
+++ b/drools-business-rules-engine.pptx
@@ -5,7 +5,7 @@
     <p:sldMasterId id="2147483658" r:id="rId2"/>
   </p:sldMasterIdLst>
   <p:notesMasterIdLst>
-    <p:notesMasterId r:id="rId32"/>
+    <p:notesMasterId r:id="rId35"/>
   </p:notesMasterIdLst>
   <p:sldIdLst>
     <p:sldId id="256" r:id="rId3"/>
@@ -30,13 +30,16 @@
     <p:sldId id="267" r:id="rId22"/>
     <p:sldId id="259" r:id="rId23"/>
     <p:sldId id="288" r:id="rId24"/>
-    <p:sldId id="271" r:id="rId25"/>
-    <p:sldId id="275" r:id="rId26"/>
-    <p:sldId id="276" r:id="rId27"/>
-    <p:sldId id="268" r:id="rId28"/>
-    <p:sldId id="270" r:id="rId29"/>
-    <p:sldId id="274" r:id="rId30"/>
-    <p:sldId id="282" r:id="rId31"/>
+    <p:sldId id="289" r:id="rId25"/>
+    <p:sldId id="290" r:id="rId26"/>
+    <p:sldId id="291" r:id="rId27"/>
+    <p:sldId id="292" r:id="rId28"/>
+    <p:sldId id="275" r:id="rId29"/>
+    <p:sldId id="276" r:id="rId30"/>
+    <p:sldId id="268" r:id="rId31"/>
+    <p:sldId id="270" r:id="rId32"/>
+    <p:sldId id="274" r:id="rId33"/>
+    <p:sldId id="282" r:id="rId34"/>
   </p:sldIdLst>
   <p:sldSz cx="9144000" cy="6858000" type="screen4x3"/>
   <p:notesSz cx="6858000" cy="9144000"/>
@@ -137,7 +140,7 @@
   </p:defaultTextStyle>
   <p:extLst>
     <p:ext uri="{EFAFB233-063F-42B5-8137-9DF3F51BA10A}">
-      <p15:sldGuideLst xmlns:p15="http://schemas.microsoft.com/office/powerpoint/2012/main">
+      <p15:sldGuideLst xmlns:p15="http://schemas.microsoft.com/office/powerpoint/2012/main" xmlns="">
         <p15:guide id="1" orient="horz" pos="2160">
           <p15:clr>
             <a:srgbClr val="A4A3A4"/>
@@ -8395,36 +8398,322 @@
         </p:nvSpPr>
         <p:spPr/>
         <p:txBody>
-          <a:bodyPr>
-            <a:normAutofit/>
-          </a:bodyPr>
-          <a:lstStyle/>
-          <a:p>
-            <a:pPr marL="109728" indent="0">
-              <a:buNone/>
-            </a:pPr>
-            <a:endParaRPr lang="pl-PL" sz="1400" dirty="0"/>
-          </a:p>
-        </p:txBody>
-      </p:sp>
-      <p:sp>
-        <p:nvSpPr>
-          <p:cNvPr id="3" name="Tytuł 2"/>
-          <p:cNvSpPr>
-            <a:spLocks noGrp="1"/>
-          </p:cNvSpPr>
-          <p:nvPr>
-            <p:ph type="title"/>
-          </p:nvPr>
-        </p:nvSpPr>
-        <p:spPr/>
-        <p:txBody>
           <a:bodyPr/>
           <a:lstStyle/>
           <a:p>
             <a:r>
-              <a:rPr lang="pl-PL" dirty="0" smtClean="0"/>
-              <a:t>kmodule.xml</a:t>
+              <a:rPr lang="pl-PL" dirty="0" err="1" smtClean="0"/>
+              <a:t>Insertions</a:t>
+            </a:r>
+            <a:r>
+              <a:rPr lang="pl-PL" dirty="0" smtClean="0"/>
+              <a:t> – </a:t>
+            </a:r>
+            <a:r>
+              <a:rPr lang="pl-PL" dirty="0" err="1" smtClean="0"/>
+              <a:t>putting</a:t>
+            </a:r>
+            <a:r>
+              <a:rPr lang="pl-PL" dirty="0" smtClean="0"/>
+              <a:t> </a:t>
+            </a:r>
+            <a:r>
+              <a:rPr lang="pl-PL" dirty="0" err="1" smtClean="0"/>
+              <a:t>fact</a:t>
+            </a:r>
+            <a:r>
+              <a:rPr lang="pl-PL" dirty="0" smtClean="0"/>
+              <a:t> </a:t>
+            </a:r>
+            <a:r>
+              <a:rPr lang="pl-PL" dirty="0" err="1" smtClean="0"/>
+              <a:t>into</a:t>
+            </a:r>
+            <a:r>
+              <a:rPr lang="pl-PL" dirty="0" smtClean="0"/>
+              <a:t> </a:t>
+            </a:r>
+            <a:r>
+              <a:rPr lang="pl-PL" dirty="0" err="1" smtClean="0"/>
+              <a:t>working</a:t>
+            </a:r>
+            <a:r>
+              <a:rPr lang="pl-PL" dirty="0" smtClean="0"/>
+              <a:t> </a:t>
+            </a:r>
+            <a:r>
+              <a:rPr lang="pl-PL" dirty="0" err="1" smtClean="0"/>
+              <a:t>memory</a:t>
+            </a:r>
+            <a:endParaRPr lang="pl-PL" dirty="0" smtClean="0"/>
+          </a:p>
+          <a:p>
+            <a:r>
+              <a:rPr lang="pl-PL" dirty="0" err="1" smtClean="0"/>
+              <a:t>Logical</a:t>
+            </a:r>
+            <a:r>
+              <a:rPr lang="pl-PL" dirty="0" smtClean="0"/>
+              <a:t> </a:t>
+            </a:r>
+            <a:r>
+              <a:rPr lang="pl-PL" dirty="0" err="1" smtClean="0"/>
+              <a:t>insertions</a:t>
+            </a:r>
+            <a:r>
+              <a:rPr lang="pl-PL" dirty="0" smtClean="0"/>
+              <a:t> – </a:t>
+            </a:r>
+            <a:r>
+              <a:rPr lang="pl-PL" dirty="0" err="1" smtClean="0"/>
+              <a:t>just</a:t>
+            </a:r>
+            <a:r>
+              <a:rPr lang="pl-PL" dirty="0" smtClean="0"/>
+              <a:t> </a:t>
+            </a:r>
+            <a:r>
+              <a:rPr lang="pl-PL" dirty="0" err="1" smtClean="0"/>
+              <a:t>firing</a:t>
+            </a:r>
+            <a:r>
+              <a:rPr lang="pl-PL" dirty="0" smtClean="0"/>
+              <a:t> the </a:t>
+            </a:r>
+            <a:r>
+              <a:rPr lang="pl-PL" dirty="0" err="1" smtClean="0"/>
+              <a:t>rules</a:t>
+            </a:r>
+            <a:r>
+              <a:rPr lang="pl-PL" dirty="0" smtClean="0"/>
+              <a:t> </a:t>
+            </a:r>
+            <a:r>
+              <a:rPr lang="pl-PL" dirty="0" err="1" smtClean="0"/>
+              <a:t>that</a:t>
+            </a:r>
+            <a:r>
+              <a:rPr lang="pl-PL" dirty="0" smtClean="0"/>
+              <a:t> </a:t>
+            </a:r>
+            <a:r>
+              <a:rPr lang="pl-PL" dirty="0" err="1" smtClean="0"/>
+              <a:t>are</a:t>
+            </a:r>
+            <a:r>
+              <a:rPr lang="pl-PL" dirty="0" smtClean="0"/>
+              <a:t> </a:t>
+            </a:r>
+            <a:r>
+              <a:rPr lang="pl-PL" dirty="0" err="1" smtClean="0"/>
+              <a:t>activated</a:t>
+            </a:r>
+            <a:r>
+              <a:rPr lang="pl-PL" dirty="0" smtClean="0"/>
+              <a:t> by </a:t>
+            </a:r>
+            <a:r>
+              <a:rPr lang="pl-PL" dirty="0" err="1" smtClean="0"/>
+              <a:t>fact</a:t>
+            </a:r>
+            <a:endParaRPr lang="pl-PL" dirty="0" smtClean="0"/>
+          </a:p>
+          <a:p>
+            <a:r>
+              <a:rPr lang="pl-PL" dirty="0" err="1" smtClean="0"/>
+              <a:t>Retraction</a:t>
+            </a:r>
+            <a:r>
+              <a:rPr lang="pl-PL" dirty="0" smtClean="0"/>
+              <a:t> – </a:t>
+            </a:r>
+            <a:r>
+              <a:rPr lang="pl-PL" dirty="0" err="1" smtClean="0"/>
+              <a:t>removing</a:t>
+            </a:r>
+            <a:r>
+              <a:rPr lang="pl-PL" dirty="0" smtClean="0"/>
+              <a:t> </a:t>
+            </a:r>
+            <a:r>
+              <a:rPr lang="pl-PL" dirty="0" err="1" smtClean="0"/>
+              <a:t>fact</a:t>
+            </a:r>
+            <a:r>
+              <a:rPr lang="pl-PL" dirty="0" smtClean="0"/>
+              <a:t> from </a:t>
+            </a:r>
+            <a:r>
+              <a:rPr lang="pl-PL" dirty="0" err="1" smtClean="0"/>
+              <a:t>memory</a:t>
+            </a:r>
+            <a:r>
+              <a:rPr lang="pl-PL" dirty="0" smtClean="0"/>
+              <a:t>, </a:t>
+            </a:r>
+            <a:r>
+              <a:rPr lang="pl-PL" dirty="0" err="1" smtClean="0"/>
+              <a:t>might</a:t>
+            </a:r>
+            <a:r>
+              <a:rPr lang="pl-PL" dirty="0" smtClean="0"/>
+              <a:t> </a:t>
+            </a:r>
+            <a:r>
+              <a:rPr lang="pl-PL" dirty="0" err="1" smtClean="0"/>
+              <a:t>also</a:t>
+            </a:r>
+            <a:r>
+              <a:rPr lang="pl-PL" dirty="0" smtClean="0"/>
+              <a:t> </a:t>
+            </a:r>
+            <a:r>
+              <a:rPr lang="pl-PL" dirty="0" err="1" smtClean="0"/>
+              <a:t>activate</a:t>
+            </a:r>
+            <a:r>
+              <a:rPr lang="pl-PL" dirty="0" smtClean="0"/>
+              <a:t> </a:t>
+            </a:r>
+            <a:r>
+              <a:rPr lang="pl-PL" dirty="0" err="1" smtClean="0"/>
+              <a:t>some</a:t>
+            </a:r>
+            <a:r>
+              <a:rPr lang="pl-PL" dirty="0" smtClean="0"/>
+              <a:t> </a:t>
+            </a:r>
+            <a:r>
+              <a:rPr lang="pl-PL" dirty="0" err="1" smtClean="0"/>
+              <a:t>rules</a:t>
+            </a:r>
+            <a:endParaRPr lang="pl-PL" dirty="0" smtClean="0"/>
+          </a:p>
+          <a:p>
+            <a:r>
+              <a:rPr lang="pl-PL" dirty="0" err="1" smtClean="0"/>
+              <a:t>Modification</a:t>
+            </a:r>
+            <a:r>
+              <a:rPr lang="pl-PL" dirty="0" smtClean="0"/>
+              <a:t> – to </a:t>
+            </a:r>
+            <a:r>
+              <a:rPr lang="pl-PL" dirty="0" err="1" smtClean="0"/>
+              <a:t>activate</a:t>
+            </a:r>
+            <a:r>
+              <a:rPr lang="pl-PL" dirty="0" smtClean="0"/>
+              <a:t> </a:t>
+            </a:r>
+            <a:r>
+              <a:rPr lang="pl-PL" dirty="0" err="1" smtClean="0"/>
+              <a:t>rules</a:t>
+            </a:r>
+            <a:r>
+              <a:rPr lang="pl-PL" dirty="0" smtClean="0"/>
+              <a:t> </a:t>
+            </a:r>
+            <a:r>
+              <a:rPr lang="pl-PL" dirty="0" err="1" smtClean="0"/>
+              <a:t>it</a:t>
+            </a:r>
+            <a:r>
+              <a:rPr lang="pl-PL" dirty="0" smtClean="0"/>
+              <a:t> </a:t>
+            </a:r>
+            <a:r>
+              <a:rPr lang="pl-PL" dirty="0" err="1" smtClean="0"/>
+              <a:t>must</a:t>
+            </a:r>
+            <a:r>
+              <a:rPr lang="pl-PL" dirty="0" smtClean="0"/>
+              <a:t> be </a:t>
+            </a:r>
+            <a:r>
+              <a:rPr lang="pl-PL" dirty="0" err="1" smtClean="0"/>
+              <a:t>done</a:t>
+            </a:r>
+            <a:r>
+              <a:rPr lang="pl-PL" dirty="0" smtClean="0"/>
+              <a:t> </a:t>
+            </a:r>
+            <a:r>
+              <a:rPr lang="pl-PL" dirty="0" err="1" smtClean="0"/>
+              <a:t>explicitly</a:t>
+            </a:r>
+            <a:r>
+              <a:rPr lang="pl-PL" dirty="0" smtClean="0"/>
+              <a:t> from API </a:t>
+            </a:r>
+            <a:r>
+              <a:rPr lang="pl-PL" dirty="0" err="1" smtClean="0"/>
+              <a:t>or</a:t>
+            </a:r>
+            <a:r>
+              <a:rPr lang="pl-PL" dirty="0" smtClean="0"/>
+              <a:t> in RHS</a:t>
+            </a:r>
+          </a:p>
+          <a:p>
+            <a:r>
+              <a:rPr lang="pl-PL" dirty="0" smtClean="0"/>
+              <a:t>Objects </a:t>
+            </a:r>
+            <a:r>
+              <a:rPr lang="pl-PL" dirty="0" err="1" smtClean="0"/>
+              <a:t>equality</a:t>
+            </a:r>
+            <a:r>
+              <a:rPr lang="pl-PL" dirty="0" smtClean="0"/>
+              <a:t> – </a:t>
+            </a:r>
+            <a:r>
+              <a:rPr lang="pl-PL" dirty="0" err="1" smtClean="0"/>
+              <a:t>equals</a:t>
+            </a:r>
+            <a:r>
+              <a:rPr lang="pl-PL" dirty="0" smtClean="0"/>
+              <a:t>() and </a:t>
+            </a:r>
+            <a:r>
+              <a:rPr lang="pl-PL" dirty="0" err="1" smtClean="0"/>
+              <a:t>hashCode</a:t>
+            </a:r>
+            <a:r>
+              <a:rPr lang="pl-PL" dirty="0" smtClean="0"/>
+              <a:t>()</a:t>
+            </a:r>
+            <a:endParaRPr lang="pl-PL" dirty="0"/>
+          </a:p>
+        </p:txBody>
+      </p:sp>
+      <p:sp>
+        <p:nvSpPr>
+          <p:cNvPr id="3" name="Tytuł 2"/>
+          <p:cNvSpPr>
+            <a:spLocks noGrp="1"/>
+          </p:cNvSpPr>
+          <p:nvPr>
+            <p:ph type="title"/>
+          </p:nvPr>
+        </p:nvSpPr>
+        <p:spPr/>
+        <p:txBody>
+          <a:bodyPr/>
+          <a:lstStyle/>
+          <a:p>
+            <a:r>
+              <a:rPr lang="pl-PL" dirty="0" err="1"/>
+              <a:t>Truth</a:t>
+            </a:r>
+            <a:r>
+              <a:rPr lang="pl-PL" dirty="0"/>
+              <a:t> </a:t>
+            </a:r>
+            <a:r>
+              <a:rPr lang="pl-PL" dirty="0" err="1"/>
+              <a:t>Maintenance</a:t>
             </a:r>
             <a:endParaRPr lang="pl-PL" dirty="0"/>
           </a:p>
@@ -8433,20 +8722,13 @@
     </p:spTree>
     <p:extLst>
       <p:ext uri="{BB962C8B-B14F-4D97-AF65-F5344CB8AC3E}">
-        <p14:creationId xmlns:p14="http://schemas.microsoft.com/office/powerpoint/2010/main" val="2797506274"/>
+        <p14:creationId xmlns:p14="http://schemas.microsoft.com/office/powerpoint/2010/main" val="3093605117"/>
       </p:ext>
     </p:extLst>
   </p:cSld>
   <p:clrMapOvr>
     <a:masterClrMapping/>
   </p:clrMapOvr>
-  <p:timing>
-    <p:tnLst>
-      <p:par>
-        <p:cTn id="1" dur="indefinite" restart="never" nodeType="tmRoot"/>
-      </p:par>
-    </p:tnLst>
-  </p:timing>
 </p:sld>
 </file>
 
@@ -8469,412 +8751,6 @@
       </p:grpSpPr>
       <p:sp>
         <p:nvSpPr>
-          <p:cNvPr id="2" name="Symbol zastępczy zawartości 1"/>
-          <p:cNvSpPr>
-            <a:spLocks noGrp="1"/>
-          </p:cNvSpPr>
-          <p:nvPr>
-            <p:ph idx="1"/>
-          </p:nvPr>
-        </p:nvSpPr>
-        <p:spPr/>
-        <p:txBody>
-          <a:bodyPr>
-            <a:normAutofit/>
-          </a:bodyPr>
-          <a:lstStyle/>
-          <a:p>
-            <a:pPr marL="109728" indent="0">
-              <a:buNone/>
-            </a:pPr>
-            <a:r>
-              <a:rPr lang="pl-PL" sz="1800" dirty="0">
-                <a:latin typeface="Lucida Console" panose="020B0609040504020204" pitchFamily="49" charset="0"/>
-              </a:rPr>
-              <a:t>[</a:t>
-            </a:r>
-            <a:r>
-              <a:rPr lang="pl-PL" sz="1800" dirty="0" err="1">
-                <a:latin typeface="Lucida Console" panose="020B0609040504020204" pitchFamily="49" charset="0"/>
-              </a:rPr>
-              <a:t>when</a:t>
-            </a:r>
-            <a:r>
-              <a:rPr lang="pl-PL" sz="1800" dirty="0">
-                <a:latin typeface="Lucida Console" panose="020B0609040504020204" pitchFamily="49" charset="0"/>
-              </a:rPr>
-              <a:t>]</a:t>
-            </a:r>
-            <a:r>
-              <a:rPr lang="pl-PL" sz="1800" dirty="0" err="1">
-                <a:latin typeface="Lucida Console" panose="020B0609040504020204" pitchFamily="49" charset="0"/>
-              </a:rPr>
-              <a:t>There</a:t>
-            </a:r>
-            <a:r>
-              <a:rPr lang="pl-PL" sz="1800" dirty="0">
-                <a:latin typeface="Lucida Console" panose="020B0609040504020204" pitchFamily="49" charset="0"/>
-              </a:rPr>
-              <a:t> </a:t>
-            </a:r>
-            <a:r>
-              <a:rPr lang="pl-PL" sz="1800" dirty="0" err="1">
-                <a:latin typeface="Lucida Console" panose="020B0609040504020204" pitchFamily="49" charset="0"/>
-              </a:rPr>
-              <a:t>is</a:t>
-            </a:r>
-            <a:r>
-              <a:rPr lang="pl-PL" sz="1800" dirty="0">
-                <a:latin typeface="Lucida Console" panose="020B0609040504020204" pitchFamily="49" charset="0"/>
-              </a:rPr>
-              <a:t> a person with </a:t>
-            </a:r>
-            <a:r>
-              <a:rPr lang="pl-PL" sz="1800" dirty="0" err="1">
-                <a:latin typeface="Lucida Console" panose="020B0609040504020204" pitchFamily="49" charset="0"/>
-              </a:rPr>
-              <a:t>name</a:t>
-            </a:r>
-            <a:r>
-              <a:rPr lang="pl-PL" sz="1800" dirty="0">
-                <a:latin typeface="Lucida Console" panose="020B0609040504020204" pitchFamily="49" charset="0"/>
-              </a:rPr>
-              <a:t> of </a:t>
-            </a:r>
-            <a:r>
-              <a:rPr lang="pl-PL" sz="1800" dirty="0" smtClean="0">
-                <a:latin typeface="Lucida Console" panose="020B0609040504020204" pitchFamily="49" charset="0"/>
-              </a:rPr>
-              <a:t>"{</a:t>
-            </a:r>
-            <a:r>
-              <a:rPr lang="pl-PL" sz="1800" dirty="0" err="1">
-                <a:latin typeface="Lucida Console" panose="020B0609040504020204" pitchFamily="49" charset="0"/>
-              </a:rPr>
-              <a:t>name</a:t>
-            </a:r>
-            <a:r>
-              <a:rPr lang="pl-PL" sz="1800" dirty="0" smtClean="0">
-                <a:latin typeface="Lucida Console" panose="020B0609040504020204" pitchFamily="49" charset="0"/>
-              </a:rPr>
-              <a:t>}„ = 	Person(</a:t>
-            </a:r>
-            <a:r>
-              <a:rPr lang="pl-PL" sz="1800" dirty="0" err="1" smtClean="0">
-                <a:latin typeface="Lucida Console" panose="020B0609040504020204" pitchFamily="49" charset="0"/>
-              </a:rPr>
-              <a:t>name</a:t>
-            </a:r>
-            <a:r>
-              <a:rPr lang="pl-PL" sz="1800" dirty="0">
-                <a:latin typeface="Lucida Console" panose="020B0609040504020204" pitchFamily="49" charset="0"/>
-              </a:rPr>
-              <a:t>=="{</a:t>
-            </a:r>
-            <a:r>
-              <a:rPr lang="pl-PL" sz="1800" dirty="0" err="1">
-                <a:latin typeface="Lucida Console" panose="020B0609040504020204" pitchFamily="49" charset="0"/>
-              </a:rPr>
-              <a:t>name</a:t>
-            </a:r>
-            <a:r>
-              <a:rPr lang="pl-PL" sz="1800" dirty="0" smtClean="0">
-                <a:latin typeface="Lucida Console" panose="020B0609040504020204" pitchFamily="49" charset="0"/>
-              </a:rPr>
-              <a:t>}")</a:t>
-            </a:r>
-          </a:p>
-          <a:p>
-            <a:pPr marL="109728" indent="0">
-              <a:buNone/>
-            </a:pPr>
-            <a:r>
-              <a:rPr lang="pl-PL" sz="1800" dirty="0" smtClean="0">
-                <a:latin typeface="Lucida Console" panose="020B0609040504020204" pitchFamily="49" charset="0"/>
-              </a:rPr>
-              <a:t>[</a:t>
-            </a:r>
-            <a:r>
-              <a:rPr lang="pl-PL" sz="1800" dirty="0" err="1">
-                <a:latin typeface="Lucida Console" panose="020B0609040504020204" pitchFamily="49" charset="0"/>
-              </a:rPr>
-              <a:t>when</a:t>
-            </a:r>
-            <a:r>
-              <a:rPr lang="pl-PL" sz="1800" dirty="0">
-                <a:latin typeface="Lucida Console" panose="020B0609040504020204" pitchFamily="49" charset="0"/>
-              </a:rPr>
-              <a:t>]Person </a:t>
-            </a:r>
-            <a:r>
-              <a:rPr lang="pl-PL" sz="1800" dirty="0" err="1">
-                <a:latin typeface="Lucida Console" panose="020B0609040504020204" pitchFamily="49" charset="0"/>
-              </a:rPr>
-              <a:t>is</a:t>
-            </a:r>
-            <a:r>
-              <a:rPr lang="pl-PL" sz="1800" dirty="0">
-                <a:latin typeface="Lucida Console" panose="020B0609040504020204" pitchFamily="49" charset="0"/>
-              </a:rPr>
-              <a:t> </a:t>
-            </a:r>
-            <a:r>
-              <a:rPr lang="pl-PL" sz="1800" dirty="0" err="1">
-                <a:latin typeface="Lucida Console" panose="020B0609040504020204" pitchFamily="49" charset="0"/>
-              </a:rPr>
-              <a:t>at</a:t>
-            </a:r>
-            <a:r>
-              <a:rPr lang="pl-PL" sz="1800" dirty="0">
-                <a:latin typeface="Lucida Console" panose="020B0609040504020204" pitchFamily="49" charset="0"/>
-              </a:rPr>
-              <a:t> </a:t>
-            </a:r>
-            <a:r>
-              <a:rPr lang="pl-PL" sz="1800" dirty="0" err="1">
-                <a:latin typeface="Lucida Console" panose="020B0609040504020204" pitchFamily="49" charset="0"/>
-              </a:rPr>
-              <a:t>least</a:t>
-            </a:r>
-            <a:r>
-              <a:rPr lang="pl-PL" sz="1800" dirty="0">
-                <a:latin typeface="Lucida Console" panose="020B0609040504020204" pitchFamily="49" charset="0"/>
-              </a:rPr>
-              <a:t> {</a:t>
-            </a:r>
-            <a:r>
-              <a:rPr lang="pl-PL" sz="1800" dirty="0" err="1">
-                <a:latin typeface="Lucida Console" panose="020B0609040504020204" pitchFamily="49" charset="0"/>
-              </a:rPr>
-              <a:t>age</a:t>
-            </a:r>
-            <a:r>
-              <a:rPr lang="pl-PL" sz="1800" dirty="0">
-                <a:latin typeface="Lucida Console" panose="020B0609040504020204" pitchFamily="49" charset="0"/>
-              </a:rPr>
-              <a:t>} </a:t>
-            </a:r>
-            <a:r>
-              <a:rPr lang="pl-PL" sz="1800" dirty="0" err="1">
-                <a:latin typeface="Lucida Console" panose="020B0609040504020204" pitchFamily="49" charset="0"/>
-              </a:rPr>
-              <a:t>years</a:t>
-            </a:r>
-            <a:r>
-              <a:rPr lang="pl-PL" sz="1800" dirty="0">
-                <a:latin typeface="Lucida Console" panose="020B0609040504020204" pitchFamily="49" charset="0"/>
-              </a:rPr>
-              <a:t> </a:t>
-            </a:r>
-            <a:r>
-              <a:rPr lang="pl-PL" sz="1800" dirty="0" err="1">
-                <a:latin typeface="Lucida Console" panose="020B0609040504020204" pitchFamily="49" charset="0"/>
-              </a:rPr>
-              <a:t>old</a:t>
-            </a:r>
-            <a:r>
-              <a:rPr lang="pl-PL" sz="1800" dirty="0">
-                <a:latin typeface="Lucida Console" panose="020B0609040504020204" pitchFamily="49" charset="0"/>
-              </a:rPr>
-              <a:t> and </a:t>
-            </a:r>
-            <a:r>
-              <a:rPr lang="pl-PL" sz="1800" dirty="0" err="1">
-                <a:latin typeface="Lucida Console" panose="020B0609040504020204" pitchFamily="49" charset="0"/>
-              </a:rPr>
-              <a:t>lives</a:t>
-            </a:r>
-            <a:r>
-              <a:rPr lang="pl-PL" sz="1800" dirty="0">
-                <a:latin typeface="Lucida Console" panose="020B0609040504020204" pitchFamily="49" charset="0"/>
-              </a:rPr>
-              <a:t> </a:t>
-            </a:r>
-            <a:r>
-              <a:rPr lang="pl-PL" sz="1800" dirty="0" smtClean="0">
-                <a:latin typeface="Lucida Console" panose="020B0609040504020204" pitchFamily="49" charset="0"/>
-              </a:rPr>
-              <a:t>	in </a:t>
-            </a:r>
-            <a:r>
-              <a:rPr lang="pl-PL" sz="1800" dirty="0">
-                <a:latin typeface="Lucida Console" panose="020B0609040504020204" pitchFamily="49" charset="0"/>
-              </a:rPr>
-              <a:t>"{</a:t>
-            </a:r>
-            <a:r>
-              <a:rPr lang="pl-PL" sz="1800" dirty="0" err="1">
-                <a:latin typeface="Lucida Console" panose="020B0609040504020204" pitchFamily="49" charset="0"/>
-              </a:rPr>
-              <a:t>location</a:t>
-            </a:r>
-            <a:r>
-              <a:rPr lang="pl-PL" sz="1800" dirty="0" smtClean="0">
-                <a:latin typeface="Lucida Console" panose="020B0609040504020204" pitchFamily="49" charset="0"/>
-              </a:rPr>
-              <a:t>}” = </a:t>
-            </a:r>
-            <a:r>
-              <a:rPr lang="pl-PL" sz="1800" dirty="0">
-                <a:latin typeface="Lucida Console" panose="020B0609040504020204" pitchFamily="49" charset="0"/>
-              </a:rPr>
-              <a:t>Person(</a:t>
-            </a:r>
-            <a:r>
-              <a:rPr lang="pl-PL" sz="1800" dirty="0" err="1">
-                <a:latin typeface="Lucida Console" panose="020B0609040504020204" pitchFamily="49" charset="0"/>
-              </a:rPr>
-              <a:t>age</a:t>
-            </a:r>
-            <a:r>
-              <a:rPr lang="pl-PL" sz="1800" dirty="0">
-                <a:latin typeface="Lucida Console" panose="020B0609040504020204" pitchFamily="49" charset="0"/>
-              </a:rPr>
-              <a:t> &gt;= {</a:t>
-            </a:r>
-            <a:r>
-              <a:rPr lang="pl-PL" sz="1800" dirty="0" err="1">
-                <a:latin typeface="Lucida Console" panose="020B0609040504020204" pitchFamily="49" charset="0"/>
-              </a:rPr>
-              <a:t>age</a:t>
-            </a:r>
-            <a:r>
-              <a:rPr lang="pl-PL" sz="1800" dirty="0">
-                <a:latin typeface="Lucida Console" panose="020B0609040504020204" pitchFamily="49" charset="0"/>
-              </a:rPr>
-              <a:t>}, </a:t>
-            </a:r>
-            <a:r>
-              <a:rPr lang="pl-PL" sz="1800" dirty="0" smtClean="0">
-                <a:latin typeface="Lucida Console" panose="020B0609040504020204" pitchFamily="49" charset="0"/>
-              </a:rPr>
-              <a:t>	</a:t>
-            </a:r>
-            <a:r>
-              <a:rPr lang="pl-PL" sz="1800" dirty="0" err="1" smtClean="0">
-                <a:latin typeface="Lucida Console" panose="020B0609040504020204" pitchFamily="49" charset="0"/>
-              </a:rPr>
-              <a:t>location</a:t>
-            </a:r>
-            <a:r>
-              <a:rPr lang="pl-PL" sz="1800" dirty="0">
-                <a:latin typeface="Lucida Console" panose="020B0609040504020204" pitchFamily="49" charset="0"/>
-              </a:rPr>
-              <a:t>=="{</a:t>
-            </a:r>
-            <a:r>
-              <a:rPr lang="pl-PL" sz="1800" dirty="0" err="1">
-                <a:latin typeface="Lucida Console" panose="020B0609040504020204" pitchFamily="49" charset="0"/>
-              </a:rPr>
-              <a:t>location</a:t>
-            </a:r>
-            <a:r>
-              <a:rPr lang="pl-PL" sz="1800" dirty="0" smtClean="0">
-                <a:latin typeface="Lucida Console" panose="020B0609040504020204" pitchFamily="49" charset="0"/>
-              </a:rPr>
-              <a:t>}")</a:t>
-            </a:r>
-          </a:p>
-          <a:p>
-            <a:pPr marL="109728" indent="0">
-              <a:buNone/>
-            </a:pPr>
-            <a:r>
-              <a:rPr lang="pl-PL" sz="1800" dirty="0" smtClean="0">
-                <a:latin typeface="Lucida Console" panose="020B0609040504020204" pitchFamily="49" charset="0"/>
-              </a:rPr>
-              <a:t>[</a:t>
-            </a:r>
-            <a:r>
-              <a:rPr lang="pl-PL" sz="1800" dirty="0" err="1">
-                <a:latin typeface="Lucida Console" panose="020B0609040504020204" pitchFamily="49" charset="0"/>
-              </a:rPr>
-              <a:t>then</a:t>
-            </a:r>
-            <a:r>
-              <a:rPr lang="pl-PL" sz="1800" dirty="0">
-                <a:latin typeface="Lucida Console" panose="020B0609040504020204" pitchFamily="49" charset="0"/>
-              </a:rPr>
-              <a:t>]Log </a:t>
-            </a:r>
-            <a:r>
-              <a:rPr lang="pl-PL" sz="1800" dirty="0" smtClean="0">
-                <a:latin typeface="Lucida Console" panose="020B0609040504020204" pitchFamily="49" charset="0"/>
-              </a:rPr>
-              <a:t>"{</a:t>
-            </a:r>
-            <a:r>
-              <a:rPr lang="pl-PL" sz="1800" dirty="0" err="1">
-                <a:latin typeface="Lucida Console" panose="020B0609040504020204" pitchFamily="49" charset="0"/>
-              </a:rPr>
-              <a:t>message</a:t>
-            </a:r>
-            <a:r>
-              <a:rPr lang="pl-PL" sz="1800" dirty="0" smtClean="0">
-                <a:latin typeface="Lucida Console" panose="020B0609040504020204" pitchFamily="49" charset="0"/>
-              </a:rPr>
-              <a:t>}„ = 	</a:t>
-            </a:r>
-            <a:r>
-              <a:rPr lang="pl-PL" sz="1800" dirty="0" err="1" smtClean="0">
-                <a:latin typeface="Lucida Console" panose="020B0609040504020204" pitchFamily="49" charset="0"/>
-              </a:rPr>
-              <a:t>System.out.println</a:t>
-            </a:r>
-            <a:r>
-              <a:rPr lang="pl-PL" sz="1800" dirty="0">
-                <a:latin typeface="Lucida Console" panose="020B0609040504020204" pitchFamily="49" charset="0"/>
-              </a:rPr>
-              <a:t>("{</a:t>
-            </a:r>
-            <a:r>
-              <a:rPr lang="pl-PL" sz="1800" dirty="0" err="1">
-                <a:latin typeface="Lucida Console" panose="020B0609040504020204" pitchFamily="49" charset="0"/>
-              </a:rPr>
-              <a:t>message</a:t>
-            </a:r>
-            <a:r>
-              <a:rPr lang="pl-PL" sz="1800" dirty="0" smtClean="0">
-                <a:latin typeface="Lucida Console" panose="020B0609040504020204" pitchFamily="49" charset="0"/>
-              </a:rPr>
-              <a:t>}");</a:t>
-            </a:r>
-          </a:p>
-          <a:p>
-            <a:pPr marL="109728" indent="0">
-              <a:buNone/>
-            </a:pPr>
-            <a:r>
-              <a:rPr lang="pl-PL" sz="1800" dirty="0" smtClean="0">
-                <a:latin typeface="Lucida Console" panose="020B0609040504020204" pitchFamily="49" charset="0"/>
-              </a:rPr>
-              <a:t>[</a:t>
-            </a:r>
-            <a:r>
-              <a:rPr lang="pl-PL" sz="1800" dirty="0" err="1">
-                <a:latin typeface="Lucida Console" panose="020B0609040504020204" pitchFamily="49" charset="0"/>
-              </a:rPr>
-              <a:t>when</a:t>
-            </a:r>
-            <a:r>
-              <a:rPr lang="pl-PL" sz="1800" dirty="0">
-                <a:latin typeface="Lucida Console" panose="020B0609040504020204" pitchFamily="49" charset="0"/>
-              </a:rPr>
-              <a:t>]And = and</a:t>
-            </a:r>
-          </a:p>
-          <a:p>
-            <a:pPr marL="109728" indent="0">
-              <a:buNone/>
-            </a:pPr>
-            <a:endParaRPr lang="pl-PL" sz="1800" dirty="0">
-              <a:latin typeface="Lucida Console" panose="020B0609040504020204" pitchFamily="49" charset="0"/>
-            </a:endParaRPr>
-          </a:p>
-        </p:txBody>
-      </p:sp>
-      <p:sp>
-        <p:nvSpPr>
           <p:cNvPr id="3" name="Tytuł 2"/>
           <p:cNvSpPr>
             <a:spLocks noGrp="1"/>
@@ -8889,46 +8765,77 @@
           <a:lstStyle/>
           <a:p>
             <a:r>
-              <a:rPr lang="pl-PL" dirty="0" err="1"/>
-              <a:t>Domain</a:t>
-            </a:r>
-            <a:r>
-              <a:rPr lang="pl-PL" dirty="0"/>
-              <a:t> </a:t>
-            </a:r>
-            <a:r>
-              <a:rPr lang="pl-PL" dirty="0" err="1"/>
-              <a:t>Specific</a:t>
-            </a:r>
-            <a:r>
-              <a:rPr lang="pl-PL" dirty="0"/>
-              <a:t> </a:t>
-            </a:r>
-            <a:r>
-              <a:rPr lang="pl-PL" dirty="0" err="1"/>
-              <a:t>Languages</a:t>
+              <a:rPr lang="pl-PL" dirty="0" smtClean="0"/>
+              <a:t>kmodule.xml</a:t>
             </a:r>
             <a:endParaRPr lang="pl-PL" dirty="0"/>
           </a:p>
         </p:txBody>
       </p:sp>
+      <p:pic>
+        <p:nvPicPr>
+          <p:cNvPr id="1026" name="Picture 2"/>
+          <p:cNvPicPr>
+            <a:picLocks noChangeAspect="1" noChangeArrowheads="1"/>
+          </p:cNvPicPr>
+          <p:nvPr/>
+        </p:nvPicPr>
+        <p:blipFill>
+          <a:blip r:embed="rId2">
+            <a:extLst>
+              <a:ext uri="{28A0092B-C50C-407E-A947-70E740481C1C}">
+                <a14:useLocalDpi xmlns:a14="http://schemas.microsoft.com/office/drawing/2010/main" val="0"/>
+              </a:ext>
+            </a:extLst>
+          </a:blip>
+          <a:srcRect/>
+          <a:stretch>
+            <a:fillRect/>
+          </a:stretch>
+        </p:blipFill>
+        <p:spPr bwMode="auto">
+          <a:xfrm>
+            <a:off x="467544" y="1412775"/>
+            <a:ext cx="8132729" cy="4388891"/>
+          </a:xfrm>
+          <a:prstGeom prst="rect">
+            <a:avLst/>
+          </a:prstGeom>
+          <a:noFill/>
+          <a:ln>
+            <a:noFill/>
+          </a:ln>
+          <a:extLst>
+            <a:ext uri="{909E8E84-426E-40DD-AFC4-6F175D3DCCD1}">
+              <a14:hiddenFill xmlns:a14="http://schemas.microsoft.com/office/drawing/2010/main">
+                <a:solidFill>
+                  <a:schemeClr val="accent1"/>
+                </a:solidFill>
+              </a14:hiddenFill>
+            </a:ext>
+            <a:ext uri="{91240B29-F687-4F45-9708-019B960494DF}">
+              <a14:hiddenLine xmlns:a14="http://schemas.microsoft.com/office/drawing/2010/main" w="9525">
+                <a:solidFill>
+                  <a:schemeClr val="tx1"/>
+                </a:solidFill>
+                <a:miter lim="800000"/>
+                <a:headEnd/>
+                <a:tailEnd/>
+              </a14:hiddenLine>
+            </a:ext>
+          </a:extLst>
+        </p:spPr>
+      </p:pic>
     </p:spTree>
     <p:extLst>
       <p:ext uri="{BB962C8B-B14F-4D97-AF65-F5344CB8AC3E}">
-        <p14:creationId xmlns:p14="http://schemas.microsoft.com/office/powerpoint/2010/main" val="1952145853"/>
+        <p14:creationId xmlns:p14="http://schemas.microsoft.com/office/powerpoint/2010/main" val="3482398841"/>
       </p:ext>
     </p:extLst>
   </p:cSld>
   <p:clrMapOvr>
     <a:masterClrMapping/>
   </p:clrMapOvr>
-  <p:timing>
-    <p:tnLst>
-      <p:par>
-        <p:cTn id="1" dur="indefinite" restart="never" nodeType="tmRoot"/>
-      </p:par>
-    </p:tnLst>
-  </p:timing>
 </p:sld>
 </file>
 
@@ -8951,624 +8858,91 @@
       </p:grpSpPr>
       <p:sp>
         <p:nvSpPr>
-          <p:cNvPr id="2" name="Symbol zastępczy zawartości 1"/>
-          <p:cNvSpPr>
-            <a:spLocks noGrp="1"/>
-          </p:cNvSpPr>
-          <p:nvPr>
-            <p:ph idx="1"/>
+          <p:cNvPr id="3" name="Tytuł 2"/>
+          <p:cNvSpPr>
+            <a:spLocks noGrp="1"/>
+          </p:cNvSpPr>
+          <p:nvPr>
+            <p:ph type="title"/>
           </p:nvPr>
         </p:nvSpPr>
         <p:spPr/>
         <p:txBody>
-          <a:bodyPr>
-            <a:normAutofit fontScale="55000" lnSpcReduction="20000"/>
-          </a:bodyPr>
+          <a:bodyPr/>
           <a:lstStyle/>
           <a:p>
-            <a:pPr marL="109728" indent="0">
-              <a:buNone/>
-            </a:pPr>
-            <a:r>
-              <a:rPr lang="pl-PL" dirty="0">
-                <a:latin typeface="Lucida Console" panose="020B0609040504020204" pitchFamily="49" charset="0"/>
-              </a:rPr>
-              <a:t>Environment </a:t>
-            </a:r>
-            <a:r>
-              <a:rPr lang="pl-PL" dirty="0" err="1">
-                <a:latin typeface="Lucida Console" panose="020B0609040504020204" pitchFamily="49" charset="0"/>
-              </a:rPr>
-              <a:t>env</a:t>
-            </a:r>
-            <a:r>
-              <a:rPr lang="pl-PL" dirty="0">
-                <a:latin typeface="Lucida Console" panose="020B0609040504020204" pitchFamily="49" charset="0"/>
-              </a:rPr>
-              <a:t> = </a:t>
-            </a:r>
-            <a:r>
-              <a:rPr lang="pl-PL" dirty="0" err="1">
-                <a:latin typeface="Lucida Console" panose="020B0609040504020204" pitchFamily="49" charset="0"/>
-              </a:rPr>
-              <a:t>KnowledgeBaseFactory.newEnvironment</a:t>
-            </a:r>
-            <a:r>
-              <a:rPr lang="pl-PL" dirty="0">
-                <a:latin typeface="Lucida Console" panose="020B0609040504020204" pitchFamily="49" charset="0"/>
-              </a:rPr>
-              <a:t>(); </a:t>
-            </a:r>
-            <a:br>
-              <a:rPr lang="pl-PL" dirty="0">
-                <a:latin typeface="Lucida Console" panose="020B0609040504020204" pitchFamily="49" charset="0"/>
-              </a:rPr>
-            </a:br>
-            <a:r>
-              <a:rPr lang="pl-PL" dirty="0" err="1">
-                <a:latin typeface="Lucida Console" panose="020B0609040504020204" pitchFamily="49" charset="0"/>
-              </a:rPr>
-              <a:t>env.set</a:t>
-            </a:r>
-            <a:r>
-              <a:rPr lang="pl-PL" dirty="0">
-                <a:latin typeface="Lucida Console" panose="020B0609040504020204" pitchFamily="49" charset="0"/>
-              </a:rPr>
-              <a:t>( </a:t>
-            </a:r>
-            <a:r>
-              <a:rPr lang="pl-PL" dirty="0" err="1">
-                <a:latin typeface="Lucida Console" panose="020B0609040504020204" pitchFamily="49" charset="0"/>
-              </a:rPr>
-              <a:t>EnvironmentName.ENTITY_MANAGER_FACTORY</a:t>
-            </a:r>
-            <a:r>
-              <a:rPr lang="pl-PL" dirty="0">
-                <a:latin typeface="Lucida Console" panose="020B0609040504020204" pitchFamily="49" charset="0"/>
-              </a:rPr>
-              <a:t>, </a:t>
-            </a:r>
-            <a:br>
-              <a:rPr lang="pl-PL" dirty="0">
-                <a:latin typeface="Lucida Console" panose="020B0609040504020204" pitchFamily="49" charset="0"/>
-              </a:rPr>
-            </a:br>
-            <a:r>
-              <a:rPr lang="pl-PL" dirty="0">
-                <a:latin typeface="Lucida Console" panose="020B0609040504020204" pitchFamily="49" charset="0"/>
-              </a:rPr>
-              <a:t>         </a:t>
-            </a:r>
-            <a:r>
-              <a:rPr lang="pl-PL" dirty="0" err="1">
-                <a:latin typeface="Lucida Console" panose="020B0609040504020204" pitchFamily="49" charset="0"/>
-              </a:rPr>
-              <a:t>Persistence.createEntityManagerFactory</a:t>
-            </a:r>
-            <a:r>
-              <a:rPr lang="pl-PL" dirty="0">
-                <a:latin typeface="Lucida Console" panose="020B0609040504020204" pitchFamily="49" charset="0"/>
-              </a:rPr>
-              <a:t>( "</a:t>
-            </a:r>
-            <a:r>
-              <a:rPr lang="pl-PL" dirty="0" err="1">
-                <a:latin typeface="Lucida Console" panose="020B0609040504020204" pitchFamily="49" charset="0"/>
-              </a:rPr>
-              <a:t>emf-name</a:t>
-            </a:r>
-            <a:r>
-              <a:rPr lang="pl-PL" dirty="0">
-                <a:latin typeface="Lucida Console" panose="020B0609040504020204" pitchFamily="49" charset="0"/>
-              </a:rPr>
-              <a:t>" ) ); </a:t>
-            </a:r>
-            <a:br>
-              <a:rPr lang="pl-PL" dirty="0">
-                <a:latin typeface="Lucida Console" panose="020B0609040504020204" pitchFamily="49" charset="0"/>
-              </a:rPr>
-            </a:br>
-            <a:r>
-              <a:rPr lang="pl-PL" dirty="0" err="1">
-                <a:latin typeface="Lucida Console" panose="020B0609040504020204" pitchFamily="49" charset="0"/>
-              </a:rPr>
-              <a:t>env.set</a:t>
-            </a:r>
-            <a:r>
-              <a:rPr lang="pl-PL" dirty="0">
-                <a:latin typeface="Lucida Console" panose="020B0609040504020204" pitchFamily="49" charset="0"/>
-              </a:rPr>
-              <a:t>( </a:t>
-            </a:r>
-            <a:r>
-              <a:rPr lang="pl-PL" dirty="0" err="1">
-                <a:latin typeface="Lucida Console" panose="020B0609040504020204" pitchFamily="49" charset="0"/>
-              </a:rPr>
-              <a:t>EnvironmentName.TRANSACTION_MANAGER</a:t>
-            </a:r>
-            <a:r>
-              <a:rPr lang="pl-PL" dirty="0">
-                <a:latin typeface="Lucida Console" panose="020B0609040504020204" pitchFamily="49" charset="0"/>
-              </a:rPr>
-              <a:t>, </a:t>
-            </a:r>
-            <a:br>
-              <a:rPr lang="pl-PL" dirty="0">
-                <a:latin typeface="Lucida Console" panose="020B0609040504020204" pitchFamily="49" charset="0"/>
-              </a:rPr>
-            </a:br>
-            <a:r>
-              <a:rPr lang="pl-PL" dirty="0">
-                <a:latin typeface="Lucida Console" panose="020B0609040504020204" pitchFamily="49" charset="0"/>
-              </a:rPr>
-              <a:t>         </a:t>
-            </a:r>
-            <a:r>
-              <a:rPr lang="pl-PL" dirty="0" err="1">
-                <a:latin typeface="Lucida Console" panose="020B0609040504020204" pitchFamily="49" charset="0"/>
-              </a:rPr>
-              <a:t>TransactionManagerServices.getTransactionManager</a:t>
-            </a:r>
-            <a:r>
-              <a:rPr lang="pl-PL" dirty="0">
-                <a:latin typeface="Lucida Console" panose="020B0609040504020204" pitchFamily="49" charset="0"/>
-              </a:rPr>
-              <a:t>() ); </a:t>
-            </a:r>
-            <a:br>
-              <a:rPr lang="pl-PL" dirty="0">
-                <a:latin typeface="Lucida Console" panose="020B0609040504020204" pitchFamily="49" charset="0"/>
-              </a:rPr>
-            </a:br>
-            <a:r>
-              <a:rPr lang="pl-PL" dirty="0">
-                <a:latin typeface="Lucida Console" panose="020B0609040504020204" pitchFamily="49" charset="0"/>
-              </a:rPr>
-              <a:t>           </a:t>
-            </a:r>
-            <a:r>
-              <a:rPr lang="pl-PL" dirty="0" smtClean="0">
-                <a:latin typeface="Lucida Console" panose="020B0609040504020204" pitchFamily="49" charset="0"/>
-              </a:rPr>
-              <a:t/>
-            </a:r>
-            <a:br>
-              <a:rPr lang="pl-PL" dirty="0" smtClean="0">
-                <a:latin typeface="Lucida Console" panose="020B0609040504020204" pitchFamily="49" charset="0"/>
-              </a:rPr>
-            </a:br>
-            <a:r>
-              <a:rPr lang="pl-PL" dirty="0">
-                <a:latin typeface="Lucida Console" panose="020B0609040504020204" pitchFamily="49" charset="0"/>
-              </a:rPr>
-              <a:t/>
-            </a:r>
-            <a:br>
-              <a:rPr lang="pl-PL" dirty="0">
-                <a:latin typeface="Lucida Console" panose="020B0609040504020204" pitchFamily="49" charset="0"/>
-              </a:rPr>
-            </a:br>
-            <a:r>
-              <a:rPr lang="pl-PL" dirty="0" err="1">
-                <a:latin typeface="Lucida Console" panose="020B0609040504020204" pitchFamily="49" charset="0"/>
-              </a:rPr>
-              <a:t>StatefulKnowledgeSession</a:t>
-            </a:r>
-            <a:r>
-              <a:rPr lang="pl-PL" dirty="0">
-                <a:latin typeface="Lucida Console" panose="020B0609040504020204" pitchFamily="49" charset="0"/>
-              </a:rPr>
-              <a:t> </a:t>
-            </a:r>
-            <a:r>
-              <a:rPr lang="pl-PL" dirty="0" err="1">
-                <a:latin typeface="Lucida Console" panose="020B0609040504020204" pitchFamily="49" charset="0"/>
-              </a:rPr>
-              <a:t>ksession</a:t>
-            </a:r>
-            <a:r>
-              <a:rPr lang="pl-PL" dirty="0">
-                <a:latin typeface="Lucida Console" panose="020B0609040504020204" pitchFamily="49" charset="0"/>
-              </a:rPr>
-              <a:t> = </a:t>
-            </a:r>
-            <a:br>
-              <a:rPr lang="pl-PL" dirty="0">
-                <a:latin typeface="Lucida Console" panose="020B0609040504020204" pitchFamily="49" charset="0"/>
-              </a:rPr>
-            </a:br>
-            <a:r>
-              <a:rPr lang="pl-PL" dirty="0">
-                <a:latin typeface="Lucida Console" panose="020B0609040504020204" pitchFamily="49" charset="0"/>
-              </a:rPr>
-              <a:t> </a:t>
-            </a:r>
-            <a:r>
-              <a:rPr lang="pl-PL" dirty="0" err="1" smtClean="0">
-                <a:latin typeface="Lucida Console" panose="020B0609040504020204" pitchFamily="49" charset="0"/>
-              </a:rPr>
-              <a:t>JPAKnowledgeService.newStatefulKnowledgeSession</a:t>
-            </a:r>
-            <a:r>
-              <a:rPr lang="pl-PL" dirty="0">
-                <a:latin typeface="Lucida Console" panose="020B0609040504020204" pitchFamily="49" charset="0"/>
-              </a:rPr>
-              <a:t>( </a:t>
-            </a:r>
-            <a:r>
-              <a:rPr lang="pl-PL" dirty="0" err="1">
-                <a:latin typeface="Lucida Console" panose="020B0609040504020204" pitchFamily="49" charset="0"/>
-              </a:rPr>
-              <a:t>kbase</a:t>
-            </a:r>
-            <a:r>
-              <a:rPr lang="pl-PL" dirty="0">
-                <a:latin typeface="Lucida Console" panose="020B0609040504020204" pitchFamily="49" charset="0"/>
-              </a:rPr>
-              <a:t>, </a:t>
-            </a:r>
-            <a:r>
-              <a:rPr lang="pl-PL" dirty="0" err="1">
-                <a:latin typeface="Lucida Console" panose="020B0609040504020204" pitchFamily="49" charset="0"/>
-              </a:rPr>
-              <a:t>null</a:t>
-            </a:r>
-            <a:r>
-              <a:rPr lang="pl-PL" dirty="0">
-                <a:latin typeface="Lucida Console" panose="020B0609040504020204" pitchFamily="49" charset="0"/>
-              </a:rPr>
-              <a:t>, </a:t>
-            </a:r>
-            <a:r>
-              <a:rPr lang="pl-PL" dirty="0" err="1">
-                <a:latin typeface="Lucida Console" panose="020B0609040504020204" pitchFamily="49" charset="0"/>
-              </a:rPr>
-              <a:t>env</a:t>
-            </a:r>
-            <a:r>
-              <a:rPr lang="pl-PL" dirty="0">
-                <a:latin typeface="Lucida Console" panose="020B0609040504020204" pitchFamily="49" charset="0"/>
-              </a:rPr>
-              <a:t> ); </a:t>
-            </a:r>
-            <a:br>
-              <a:rPr lang="pl-PL" dirty="0">
-                <a:latin typeface="Lucida Console" panose="020B0609040504020204" pitchFamily="49" charset="0"/>
-              </a:rPr>
-            </a:br>
-            <a:r>
-              <a:rPr lang="pl-PL" dirty="0" err="1">
-                <a:latin typeface="Lucida Console" panose="020B0609040504020204" pitchFamily="49" charset="0"/>
-              </a:rPr>
-              <a:t>int</a:t>
-            </a:r>
-            <a:r>
-              <a:rPr lang="pl-PL" dirty="0">
-                <a:latin typeface="Lucida Console" panose="020B0609040504020204" pitchFamily="49" charset="0"/>
-              </a:rPr>
-              <a:t> </a:t>
-            </a:r>
-            <a:r>
-              <a:rPr lang="pl-PL" dirty="0" err="1">
-                <a:latin typeface="Lucida Console" panose="020B0609040504020204" pitchFamily="49" charset="0"/>
-              </a:rPr>
-              <a:t>sessionId</a:t>
-            </a:r>
-            <a:r>
-              <a:rPr lang="pl-PL" dirty="0">
-                <a:latin typeface="Lucida Console" panose="020B0609040504020204" pitchFamily="49" charset="0"/>
-              </a:rPr>
-              <a:t> = </a:t>
-            </a:r>
-            <a:r>
-              <a:rPr lang="pl-PL" dirty="0" err="1">
-                <a:latin typeface="Lucida Console" panose="020B0609040504020204" pitchFamily="49" charset="0"/>
-              </a:rPr>
-              <a:t>ksession.getId</a:t>
-            </a:r>
-            <a:r>
-              <a:rPr lang="pl-PL" dirty="0">
-                <a:latin typeface="Lucida Console" panose="020B0609040504020204" pitchFamily="49" charset="0"/>
-              </a:rPr>
-              <a:t>(); </a:t>
-            </a:r>
-            <a:br>
-              <a:rPr lang="pl-PL" dirty="0">
-                <a:latin typeface="Lucida Console" panose="020B0609040504020204" pitchFamily="49" charset="0"/>
-              </a:rPr>
-            </a:br>
-            <a:r>
-              <a:rPr lang="pl-PL" dirty="0">
-                <a:latin typeface="Lucida Console" panose="020B0609040504020204" pitchFamily="49" charset="0"/>
-              </a:rPr>
-              <a:t>  </a:t>
-            </a:r>
-            <a:br>
-              <a:rPr lang="pl-PL" dirty="0">
-                <a:latin typeface="Lucida Console" panose="020B0609040504020204" pitchFamily="49" charset="0"/>
-              </a:rPr>
-            </a:br>
-            <a:r>
-              <a:rPr lang="pl-PL" dirty="0" err="1">
-                <a:latin typeface="Lucida Console" panose="020B0609040504020204" pitchFamily="49" charset="0"/>
-              </a:rPr>
-              <a:t>UserTransaction</a:t>
-            </a:r>
-            <a:r>
-              <a:rPr lang="pl-PL" dirty="0">
-                <a:latin typeface="Lucida Console" panose="020B0609040504020204" pitchFamily="49" charset="0"/>
-              </a:rPr>
-              <a:t> </a:t>
-            </a:r>
-            <a:r>
-              <a:rPr lang="pl-PL" dirty="0" err="1">
-                <a:latin typeface="Lucida Console" panose="020B0609040504020204" pitchFamily="49" charset="0"/>
-              </a:rPr>
-              <a:t>ut</a:t>
-            </a:r>
-            <a:r>
-              <a:rPr lang="pl-PL" dirty="0">
-                <a:latin typeface="Lucida Console" panose="020B0609040504020204" pitchFamily="49" charset="0"/>
-              </a:rPr>
-              <a:t> = </a:t>
-            </a:r>
-            <a:br>
-              <a:rPr lang="pl-PL" dirty="0">
-                <a:latin typeface="Lucida Console" panose="020B0609040504020204" pitchFamily="49" charset="0"/>
-              </a:rPr>
-            </a:br>
-            <a:r>
-              <a:rPr lang="pl-PL" dirty="0">
-                <a:latin typeface="Lucida Console" panose="020B0609040504020204" pitchFamily="49" charset="0"/>
-              </a:rPr>
-              <a:t>  (</a:t>
-            </a:r>
-            <a:r>
-              <a:rPr lang="pl-PL" dirty="0" err="1">
-                <a:latin typeface="Lucida Console" panose="020B0609040504020204" pitchFamily="49" charset="0"/>
-              </a:rPr>
-              <a:t>UserTransaction</a:t>
-            </a:r>
-            <a:r>
-              <a:rPr lang="pl-PL" dirty="0">
-                <a:latin typeface="Lucida Console" panose="020B0609040504020204" pitchFamily="49" charset="0"/>
-              </a:rPr>
-              <a:t>) </a:t>
-            </a:r>
-            <a:r>
-              <a:rPr lang="pl-PL" b="1" dirty="0" err="1">
-                <a:latin typeface="Lucida Console" panose="020B0609040504020204" pitchFamily="49" charset="0"/>
-              </a:rPr>
-              <a:t>new</a:t>
-            </a:r>
-            <a:r>
-              <a:rPr lang="pl-PL" dirty="0">
-                <a:latin typeface="Lucida Console" panose="020B0609040504020204" pitchFamily="49" charset="0"/>
-              </a:rPr>
-              <a:t> </a:t>
-            </a:r>
-            <a:r>
-              <a:rPr lang="pl-PL" dirty="0" err="1">
-                <a:latin typeface="Lucida Console" panose="020B0609040504020204" pitchFamily="49" charset="0"/>
-              </a:rPr>
-              <a:t>InitialContext</a:t>
-            </a:r>
-            <a:r>
-              <a:rPr lang="pl-PL" dirty="0">
-                <a:latin typeface="Lucida Console" panose="020B0609040504020204" pitchFamily="49" charset="0"/>
-              </a:rPr>
-              <a:t>().</a:t>
-            </a:r>
-            <a:r>
-              <a:rPr lang="pl-PL" dirty="0" err="1">
-                <a:latin typeface="Lucida Console" panose="020B0609040504020204" pitchFamily="49" charset="0"/>
-              </a:rPr>
-              <a:t>lookup</a:t>
-            </a:r>
-            <a:r>
-              <a:rPr lang="pl-PL" dirty="0">
-                <a:latin typeface="Lucida Console" panose="020B0609040504020204" pitchFamily="49" charset="0"/>
-              </a:rPr>
-              <a:t>( </a:t>
-            </a:r>
-            <a:endParaRPr lang="pl-PL" dirty="0" smtClean="0">
-              <a:latin typeface="Lucida Console" panose="020B0609040504020204" pitchFamily="49" charset="0"/>
-            </a:endParaRPr>
-          </a:p>
-          <a:p>
-            <a:pPr marL="109728" indent="0">
-              <a:buNone/>
-            </a:pPr>
-            <a:r>
-              <a:rPr lang="pl-PL" dirty="0">
-                <a:latin typeface="Lucida Console" panose="020B0609040504020204" pitchFamily="49" charset="0"/>
-              </a:rPr>
-              <a:t>	</a:t>
-            </a:r>
-            <a:r>
-              <a:rPr lang="pl-PL" dirty="0" smtClean="0">
-                <a:latin typeface="Lucida Console" panose="020B0609040504020204" pitchFamily="49" charset="0"/>
-              </a:rPr>
-              <a:t>"</a:t>
-            </a:r>
-            <a:r>
-              <a:rPr lang="pl-PL" dirty="0" err="1">
-                <a:latin typeface="Lucida Console" panose="020B0609040504020204" pitchFamily="49" charset="0"/>
-              </a:rPr>
-              <a:t>java:comp</a:t>
-            </a:r>
-            <a:r>
-              <a:rPr lang="pl-PL" dirty="0">
-                <a:latin typeface="Lucida Console" panose="020B0609040504020204" pitchFamily="49" charset="0"/>
-              </a:rPr>
-              <a:t>/</a:t>
-            </a:r>
-            <a:r>
-              <a:rPr lang="pl-PL" dirty="0" err="1">
-                <a:latin typeface="Lucida Console" panose="020B0609040504020204" pitchFamily="49" charset="0"/>
-              </a:rPr>
-              <a:t>UserTransaction</a:t>
-            </a:r>
-            <a:r>
-              <a:rPr lang="pl-PL" dirty="0">
-                <a:latin typeface="Lucida Console" panose="020B0609040504020204" pitchFamily="49" charset="0"/>
-              </a:rPr>
-              <a:t>" ); </a:t>
-            </a:r>
-            <a:br>
-              <a:rPr lang="pl-PL" dirty="0">
-                <a:latin typeface="Lucida Console" panose="020B0609040504020204" pitchFamily="49" charset="0"/>
-              </a:rPr>
-            </a:br>
-            <a:r>
-              <a:rPr lang="pl-PL" dirty="0" err="1">
-                <a:latin typeface="Lucida Console" panose="020B0609040504020204" pitchFamily="49" charset="0"/>
-              </a:rPr>
-              <a:t>ut.begin</a:t>
-            </a:r>
-            <a:r>
-              <a:rPr lang="pl-PL" dirty="0">
-                <a:latin typeface="Lucida Console" panose="020B0609040504020204" pitchFamily="49" charset="0"/>
-              </a:rPr>
-              <a:t>(); </a:t>
-            </a:r>
-            <a:br>
-              <a:rPr lang="pl-PL" dirty="0">
-                <a:latin typeface="Lucida Console" panose="020B0609040504020204" pitchFamily="49" charset="0"/>
-              </a:rPr>
-            </a:br>
-            <a:r>
-              <a:rPr lang="pl-PL" dirty="0" err="1">
-                <a:latin typeface="Lucida Console" panose="020B0609040504020204" pitchFamily="49" charset="0"/>
-              </a:rPr>
-              <a:t>ksession.insert</a:t>
-            </a:r>
-            <a:r>
-              <a:rPr lang="pl-PL" dirty="0">
-                <a:latin typeface="Lucida Console" panose="020B0609040504020204" pitchFamily="49" charset="0"/>
-              </a:rPr>
-              <a:t>( data1 ); </a:t>
-            </a:r>
-            <a:br>
-              <a:rPr lang="pl-PL" dirty="0">
-                <a:latin typeface="Lucida Console" panose="020B0609040504020204" pitchFamily="49" charset="0"/>
-              </a:rPr>
-            </a:br>
-            <a:r>
-              <a:rPr lang="pl-PL" dirty="0" err="1">
-                <a:latin typeface="Lucida Console" panose="020B0609040504020204" pitchFamily="49" charset="0"/>
-              </a:rPr>
-              <a:t>ksession.insert</a:t>
-            </a:r>
-            <a:r>
-              <a:rPr lang="pl-PL" dirty="0">
-                <a:latin typeface="Lucida Console" panose="020B0609040504020204" pitchFamily="49" charset="0"/>
-              </a:rPr>
-              <a:t>( data2 ); </a:t>
-            </a:r>
-            <a:br>
-              <a:rPr lang="pl-PL" dirty="0">
-                <a:latin typeface="Lucida Console" panose="020B0609040504020204" pitchFamily="49" charset="0"/>
-              </a:rPr>
-            </a:br>
-            <a:r>
-              <a:rPr lang="pl-PL" dirty="0" err="1">
-                <a:latin typeface="Lucida Console" panose="020B0609040504020204" pitchFamily="49" charset="0"/>
-              </a:rPr>
-              <a:t>ksession.startProcess</a:t>
-            </a:r>
-            <a:r>
-              <a:rPr lang="pl-PL" dirty="0">
-                <a:latin typeface="Lucida Console" panose="020B0609040504020204" pitchFamily="49" charset="0"/>
-              </a:rPr>
-              <a:t>( "process1" ); </a:t>
-            </a:r>
-            <a:br>
-              <a:rPr lang="pl-PL" dirty="0">
-                <a:latin typeface="Lucida Console" panose="020B0609040504020204" pitchFamily="49" charset="0"/>
-              </a:rPr>
-            </a:br>
-            <a:r>
-              <a:rPr lang="pl-PL" dirty="0" err="1">
-                <a:latin typeface="Lucida Console" panose="020B0609040504020204" pitchFamily="49" charset="0"/>
-              </a:rPr>
-              <a:t>ut.commit</a:t>
-            </a:r>
-            <a:r>
-              <a:rPr lang="pl-PL" dirty="0">
-                <a:latin typeface="Lucida Console" panose="020B0609040504020204" pitchFamily="49" charset="0"/>
-              </a:rPr>
-              <a:t>();</a:t>
-            </a:r>
-          </a:p>
-          <a:p>
-            <a:pPr marL="109728" indent="0">
-              <a:buNone/>
-            </a:pPr>
-            <a:endParaRPr lang="pl-PL" dirty="0">
-              <a:latin typeface="Lucida Console" panose="020B0609040504020204" pitchFamily="49" charset="0"/>
-            </a:endParaRPr>
-          </a:p>
-        </p:txBody>
-      </p:sp>
-      <p:sp>
-        <p:nvSpPr>
-          <p:cNvPr id="3" name="Tytuł 2"/>
-          <p:cNvSpPr>
-            <a:spLocks noGrp="1"/>
-          </p:cNvSpPr>
-          <p:nvPr>
-            <p:ph type="title"/>
-          </p:nvPr>
-        </p:nvSpPr>
-        <p:spPr/>
-        <p:txBody>
-          <a:bodyPr>
-            <a:normAutofit fontScale="90000"/>
-          </a:bodyPr>
-          <a:lstStyle/>
-          <a:p>
-            <a:r>
-              <a:rPr lang="pl-PL" dirty="0" err="1" smtClean="0"/>
-              <a:t>Persistence</a:t>
-            </a:r>
-            <a:r>
-              <a:rPr lang="pl-PL" dirty="0" smtClean="0"/>
-              <a:t> </a:t>
-            </a:r>
-            <a:r>
-              <a:rPr lang="pl-PL" dirty="0" err="1" smtClean="0"/>
-              <a:t>framework</a:t>
-            </a:r>
-            <a:r>
-              <a:rPr lang="pl-PL" dirty="0" smtClean="0"/>
-              <a:t> </a:t>
-            </a:r>
-            <a:r>
-              <a:rPr lang="pl-PL" dirty="0" err="1" smtClean="0"/>
-              <a:t>integration</a:t>
+            <a:r>
+              <a:rPr lang="pl-PL" dirty="0" err="1" smtClean="0"/>
+              <a:t>kie-maven-plugin</a:t>
             </a:r>
             <a:endParaRPr lang="pl-PL" dirty="0"/>
           </a:p>
         </p:txBody>
       </p:sp>
+      <p:pic>
+        <p:nvPicPr>
+          <p:cNvPr id="2050" name="Picture 2"/>
+          <p:cNvPicPr>
+            <a:picLocks noChangeAspect="1" noChangeArrowheads="1"/>
+          </p:cNvPicPr>
+          <p:nvPr/>
+        </p:nvPicPr>
+        <p:blipFill>
+          <a:blip r:embed="rId2">
+            <a:extLst>
+              <a:ext uri="{28A0092B-C50C-407E-A947-70E740481C1C}">
+                <a14:useLocalDpi xmlns:a14="http://schemas.microsoft.com/office/drawing/2010/main" val="0"/>
+              </a:ext>
+            </a:extLst>
+          </a:blip>
+          <a:srcRect/>
+          <a:stretch>
+            <a:fillRect/>
+          </a:stretch>
+        </p:blipFill>
+        <p:spPr bwMode="auto">
+          <a:xfrm>
+            <a:off x="883374" y="1844824"/>
+            <a:ext cx="6846819" cy="2980928"/>
+          </a:xfrm>
+          <a:prstGeom prst="rect">
+            <a:avLst/>
+          </a:prstGeom>
+          <a:noFill/>
+          <a:ln>
+            <a:noFill/>
+          </a:ln>
+          <a:extLst>
+            <a:ext uri="{909E8E84-426E-40DD-AFC4-6F175D3DCCD1}">
+              <a14:hiddenFill xmlns:a14="http://schemas.microsoft.com/office/drawing/2010/main">
+                <a:solidFill>
+                  <a:schemeClr val="accent1"/>
+                </a:solidFill>
+              </a14:hiddenFill>
+            </a:ext>
+            <a:ext uri="{91240B29-F687-4F45-9708-019B960494DF}">
+              <a14:hiddenLine xmlns:a14="http://schemas.microsoft.com/office/drawing/2010/main" w="9525">
+                <a:solidFill>
+                  <a:schemeClr val="tx1"/>
+                </a:solidFill>
+                <a:miter lim="800000"/>
+                <a:headEnd/>
+                <a:tailEnd/>
+              </a14:hiddenLine>
+            </a:ext>
+          </a:extLst>
+        </p:spPr>
+      </p:pic>
     </p:spTree>
     <p:extLst>
       <p:ext uri="{BB962C8B-B14F-4D97-AF65-F5344CB8AC3E}">
-        <p14:creationId xmlns:p14="http://schemas.microsoft.com/office/powerpoint/2010/main" val="1896570916"/>
+        <p14:creationId xmlns:p14="http://schemas.microsoft.com/office/powerpoint/2010/main" val="393531924"/>
       </p:ext>
     </p:extLst>
   </p:cSld>
   <p:clrMapOvr>
     <a:masterClrMapping/>
   </p:clrMapOvr>
-  <p:timing>
-    <p:tnLst>
-      <p:par>
-        <p:cTn id="1" dur="indefinite" restart="never" nodeType="tmRoot"/>
-      </p:par>
-    </p:tnLst>
-  </p:timing>
 </p:sld>
 </file>
 
@@ -9591,12 +8965,12 @@
       </p:grpSpPr>
       <p:sp>
         <p:nvSpPr>
-          <p:cNvPr id="2" name="Symbol zastępczy zawartości 1"/>
-          <p:cNvSpPr>
-            <a:spLocks noGrp="1"/>
-          </p:cNvSpPr>
-          <p:nvPr>
-            <p:ph idx="1"/>
+          <p:cNvPr id="3" name="Tytuł 2"/>
+          <p:cNvSpPr>
+            <a:spLocks noGrp="1"/>
+          </p:cNvSpPr>
+          <p:nvPr>
+            <p:ph type="title"/>
           </p:nvPr>
         </p:nvSpPr>
         <p:spPr/>
@@ -9606,160 +8980,76 @@
           <a:p>
             <a:r>
               <a:rPr lang="pl-PL" dirty="0" err="1" smtClean="0"/>
-              <a:t>Declarative</a:t>
-            </a:r>
-            <a:r>
-              <a:rPr lang="pl-PL" dirty="0" smtClean="0"/>
-              <a:t> </a:t>
-            </a:r>
-            <a:r>
-              <a:rPr lang="pl-PL" dirty="0" err="1" smtClean="0"/>
-              <a:t>programming</a:t>
-            </a:r>
-            <a:endParaRPr lang="pl-PL" dirty="0" smtClean="0"/>
-          </a:p>
-          <a:p>
-            <a:r>
-              <a:rPr lang="pl-PL" dirty="0" err="1" smtClean="0"/>
-              <a:t>Logic</a:t>
-            </a:r>
-            <a:r>
-              <a:rPr lang="pl-PL" dirty="0" smtClean="0"/>
-              <a:t> and data </a:t>
-            </a:r>
-            <a:r>
-              <a:rPr lang="pl-PL" dirty="0" err="1" smtClean="0"/>
-              <a:t>separation</a:t>
-            </a:r>
-            <a:endParaRPr lang="pl-PL" dirty="0" smtClean="0"/>
-          </a:p>
-          <a:p>
-            <a:r>
-              <a:rPr lang="pl-PL" dirty="0" err="1" smtClean="0"/>
-              <a:t>Speed</a:t>
-            </a:r>
-            <a:r>
-              <a:rPr lang="pl-PL" dirty="0" smtClean="0"/>
-              <a:t> and </a:t>
-            </a:r>
-            <a:r>
-              <a:rPr lang="pl-PL" dirty="0" err="1" smtClean="0"/>
-              <a:t>Scalability</a:t>
-            </a:r>
-            <a:endParaRPr lang="pl-PL" dirty="0" smtClean="0"/>
-          </a:p>
-          <a:p>
-            <a:r>
-              <a:rPr lang="pl-PL" dirty="0" err="1" smtClean="0"/>
-              <a:t>Centralization</a:t>
-            </a:r>
-            <a:r>
-              <a:rPr lang="pl-PL" dirty="0" smtClean="0"/>
-              <a:t> of Knowledge</a:t>
-            </a:r>
-          </a:p>
-          <a:p>
-            <a:r>
-              <a:rPr lang="pl-PL" dirty="0" err="1" smtClean="0"/>
-              <a:t>Tool</a:t>
-            </a:r>
-            <a:r>
-              <a:rPr lang="pl-PL" dirty="0"/>
-              <a:t> </a:t>
-            </a:r>
-            <a:r>
-              <a:rPr lang="pl-PL" dirty="0" smtClean="0"/>
-              <a:t>Integration</a:t>
-            </a:r>
-          </a:p>
-          <a:p>
-            <a:r>
-              <a:rPr lang="pl-PL" dirty="0" err="1" smtClean="0"/>
-              <a:t>Explanation</a:t>
-            </a:r>
-            <a:r>
-              <a:rPr lang="pl-PL" dirty="0" smtClean="0"/>
-              <a:t> </a:t>
-            </a:r>
-            <a:r>
-              <a:rPr lang="pl-PL" dirty="0" err="1" smtClean="0"/>
-              <a:t>facility</a:t>
-            </a:r>
-            <a:endParaRPr lang="pl-PL" dirty="0" smtClean="0"/>
-          </a:p>
-          <a:p>
-            <a:r>
-              <a:rPr lang="pl-PL" dirty="0" err="1" smtClean="0"/>
-              <a:t>Understandable</a:t>
-            </a:r>
-            <a:r>
-              <a:rPr lang="pl-PL" dirty="0" smtClean="0"/>
-              <a:t> </a:t>
-            </a:r>
-            <a:r>
-              <a:rPr lang="pl-PL" dirty="0" err="1" smtClean="0"/>
-              <a:t>rules</a:t>
+              <a:t>KieLogger</a:t>
             </a:r>
             <a:endParaRPr lang="pl-PL" dirty="0"/>
           </a:p>
         </p:txBody>
       </p:sp>
-      <p:sp>
-        <p:nvSpPr>
-          <p:cNvPr id="3" name="Tytuł 2"/>
-          <p:cNvSpPr>
-            <a:spLocks noGrp="1"/>
-          </p:cNvSpPr>
-          <p:nvPr>
-            <p:ph type="title"/>
-          </p:nvPr>
-        </p:nvSpPr>
-        <p:spPr/>
-        <p:txBody>
-          <a:bodyPr/>
-          <a:lstStyle/>
-          <a:p>
-            <a:r>
-              <a:rPr lang="pl-PL" dirty="0" err="1" smtClean="0"/>
-              <a:t>Adventages</a:t>
-            </a:r>
-            <a:r>
-              <a:rPr lang="pl-PL" dirty="0" smtClean="0"/>
-              <a:t> of </a:t>
-            </a:r>
-            <a:r>
-              <a:rPr lang="pl-PL" dirty="0" err="1" smtClean="0"/>
-              <a:t>rule</a:t>
-            </a:r>
-            <a:r>
-              <a:rPr lang="pl-PL" dirty="0" smtClean="0"/>
-              <a:t> </a:t>
-            </a:r>
-            <a:r>
-              <a:rPr lang="pl-PL" dirty="0" err="1" smtClean="0"/>
-              <a:t>engine</a:t>
-            </a:r>
-            <a:endParaRPr lang="pl-PL" dirty="0"/>
-          </a:p>
-        </p:txBody>
-      </p:sp>
+      <p:pic>
+        <p:nvPicPr>
+          <p:cNvPr id="3074" name="Picture 2"/>
+          <p:cNvPicPr>
+            <a:picLocks noChangeAspect="1" noChangeArrowheads="1"/>
+          </p:cNvPicPr>
+          <p:nvPr/>
+        </p:nvPicPr>
+        <p:blipFill>
+          <a:blip r:embed="rId2">
+            <a:extLst>
+              <a:ext uri="{28A0092B-C50C-407E-A947-70E740481C1C}">
+                <a14:useLocalDpi xmlns:a14="http://schemas.microsoft.com/office/drawing/2010/main" val="0"/>
+              </a:ext>
+            </a:extLst>
+          </a:blip>
+          <a:srcRect/>
+          <a:stretch>
+            <a:fillRect/>
+          </a:stretch>
+        </p:blipFill>
+        <p:spPr bwMode="auto">
+          <a:xfrm>
+            <a:off x="611560" y="2132856"/>
+            <a:ext cx="8316001" cy="1152128"/>
+          </a:xfrm>
+          <a:prstGeom prst="rect">
+            <a:avLst/>
+          </a:prstGeom>
+          <a:noFill/>
+          <a:ln>
+            <a:noFill/>
+          </a:ln>
+          <a:extLst>
+            <a:ext uri="{909E8E84-426E-40DD-AFC4-6F175D3DCCD1}">
+              <a14:hiddenFill xmlns:a14="http://schemas.microsoft.com/office/drawing/2010/main">
+                <a:solidFill>
+                  <a:schemeClr val="accent1"/>
+                </a:solidFill>
+              </a14:hiddenFill>
+            </a:ext>
+            <a:ext uri="{91240B29-F687-4F45-9708-019B960494DF}">
+              <a14:hiddenLine xmlns:a14="http://schemas.microsoft.com/office/drawing/2010/main" w="9525">
+                <a:solidFill>
+                  <a:schemeClr val="tx1"/>
+                </a:solidFill>
+                <a:miter lim="800000"/>
+                <a:headEnd/>
+                <a:tailEnd/>
+              </a14:hiddenLine>
+            </a:ext>
+          </a:extLst>
+        </p:spPr>
+      </p:pic>
     </p:spTree>
     <p:extLst>
       <p:ext uri="{BB962C8B-B14F-4D97-AF65-F5344CB8AC3E}">
-        <p14:creationId xmlns:p14="http://schemas.microsoft.com/office/powerpoint/2010/main" val="3095177641"/>
+        <p14:creationId xmlns:p14="http://schemas.microsoft.com/office/powerpoint/2010/main" val="337450005"/>
       </p:ext>
     </p:extLst>
   </p:cSld>
   <p:clrMapOvr>
     <a:masterClrMapping/>
   </p:clrMapOvr>
-  <p:timing>
-    <p:tnLst>
-      <p:par>
-        <p:cTn id="1" dur="indefinite" restart="never" nodeType="tmRoot"/>
-      </p:par>
-    </p:tnLst>
-  </p:timing>
 </p:sld>
 </file>
 
@@ -9782,7 +9072,7 @@
       </p:grpSpPr>
       <p:sp>
         <p:nvSpPr>
-          <p:cNvPr id="2" name="Tytuł 1"/>
+          <p:cNvPr id="3" name="Tytuł 2"/>
           <p:cNvSpPr>
             <a:spLocks noGrp="1"/>
           </p:cNvSpPr>
@@ -9797,284 +9087,86 @@
           <a:p>
             <a:r>
               <a:rPr lang="pl-PL" dirty="0" err="1"/>
-              <a:t>When</a:t>
+              <a:t>Domain</a:t>
             </a:r>
             <a:r>
               <a:rPr lang="pl-PL" dirty="0"/>
-              <a:t> to </a:t>
+              <a:t> </a:t>
             </a:r>
             <a:r>
               <a:rPr lang="pl-PL" dirty="0" err="1"/>
-              <a:t>use</a:t>
+              <a:t>Specific</a:t>
             </a:r>
             <a:r>
               <a:rPr lang="pl-PL" dirty="0"/>
-              <a:t>, </a:t>
+              <a:t> </a:t>
             </a:r>
             <a:r>
               <a:rPr lang="pl-PL" dirty="0" err="1"/>
-              <a:t>when</a:t>
-            </a:r>
-            <a:r>
-              <a:rPr lang="pl-PL" dirty="0"/>
-              <a:t> not to</a:t>
-            </a:r>
-          </a:p>
-        </p:txBody>
-      </p:sp>
-      <p:sp>
-        <p:nvSpPr>
-          <p:cNvPr id="3" name="Symbol zastępczy tekstu 2"/>
-          <p:cNvSpPr>
-            <a:spLocks noGrp="1"/>
-          </p:cNvSpPr>
-          <p:nvPr>
-            <p:ph type="body" idx="1"/>
-          </p:nvPr>
-        </p:nvSpPr>
-        <p:spPr/>
-        <p:txBody>
-          <a:bodyPr/>
-          <a:lstStyle/>
-          <a:p>
+              <a:t>Languages</a:t>
+            </a:r>
             <a:endParaRPr lang="pl-PL" dirty="0"/>
           </a:p>
         </p:txBody>
       </p:sp>
-      <p:sp>
-        <p:nvSpPr>
-          <p:cNvPr id="4" name="Symbol zastępczy tekstu 3"/>
-          <p:cNvSpPr>
-            <a:spLocks noGrp="1"/>
-          </p:cNvSpPr>
-          <p:nvPr>
-            <p:ph type="body" sz="half" idx="3"/>
-          </p:nvPr>
-        </p:nvSpPr>
-        <p:spPr/>
-        <p:txBody>
-          <a:bodyPr/>
-          <a:lstStyle/>
-          <a:p>
-            <a:endParaRPr lang="pl-PL"/>
-          </a:p>
-        </p:txBody>
-      </p:sp>
-      <p:sp>
-        <p:nvSpPr>
-          <p:cNvPr id="5" name="Symbol zastępczy zawartości 4"/>
-          <p:cNvSpPr>
-            <a:spLocks noGrp="1"/>
-          </p:cNvSpPr>
-          <p:nvPr>
-            <p:ph sz="quarter" idx="2"/>
-          </p:nvPr>
-        </p:nvSpPr>
-        <p:spPr/>
-        <p:txBody>
-          <a:bodyPr>
-            <a:normAutofit lnSpcReduction="10000"/>
-          </a:bodyPr>
-          <a:lstStyle/>
-          <a:p>
-            <a:r>
-              <a:rPr lang="pl-PL" dirty="0" smtClean="0"/>
-              <a:t>The problem </a:t>
-            </a:r>
-            <a:r>
-              <a:rPr lang="pl-PL" dirty="0" err="1" smtClean="0"/>
-              <a:t>is</a:t>
-            </a:r>
-            <a:r>
-              <a:rPr lang="pl-PL" dirty="0" smtClean="0"/>
-              <a:t> </a:t>
-            </a:r>
-            <a:r>
-              <a:rPr lang="pl-PL" dirty="0" err="1" smtClean="0"/>
-              <a:t>too</a:t>
-            </a:r>
-            <a:r>
-              <a:rPr lang="pl-PL" dirty="0" smtClean="0"/>
-              <a:t> </a:t>
-            </a:r>
-            <a:r>
-              <a:rPr lang="pl-PL" dirty="0" err="1" smtClean="0"/>
-              <a:t>fiddly</a:t>
-            </a:r>
-            <a:r>
-              <a:rPr lang="pl-PL" dirty="0" smtClean="0"/>
-              <a:t> for </a:t>
-            </a:r>
-            <a:r>
-              <a:rPr lang="pl-PL" dirty="0" err="1" smtClean="0"/>
-              <a:t>traditional</a:t>
-            </a:r>
-            <a:r>
-              <a:rPr lang="pl-PL" dirty="0" smtClean="0"/>
-              <a:t> </a:t>
-            </a:r>
-            <a:r>
-              <a:rPr lang="pl-PL" dirty="0" err="1" smtClean="0"/>
-              <a:t>code</a:t>
-            </a:r>
-            <a:endParaRPr lang="pl-PL" dirty="0" smtClean="0"/>
-          </a:p>
-          <a:p>
-            <a:r>
-              <a:rPr lang="pl-PL" dirty="0" smtClean="0"/>
-              <a:t>The problem </a:t>
-            </a:r>
-            <a:r>
-              <a:rPr lang="pl-PL" dirty="0" err="1" smtClean="0"/>
-              <a:t>is</a:t>
-            </a:r>
-            <a:r>
-              <a:rPr lang="pl-PL" dirty="0" smtClean="0"/>
-              <a:t> </a:t>
-            </a:r>
-            <a:r>
-              <a:rPr lang="pl-PL" dirty="0" err="1" smtClean="0"/>
-              <a:t>beyond</a:t>
-            </a:r>
-            <a:r>
-              <a:rPr lang="pl-PL" dirty="0" smtClean="0"/>
-              <a:t> </a:t>
-            </a:r>
-            <a:r>
-              <a:rPr lang="pl-PL" dirty="0" err="1" smtClean="0"/>
-              <a:t>any</a:t>
-            </a:r>
-            <a:r>
-              <a:rPr lang="pl-PL" dirty="0" smtClean="0"/>
-              <a:t> </a:t>
-            </a:r>
-            <a:r>
-              <a:rPr lang="pl-PL" dirty="0" err="1" smtClean="0"/>
-              <a:t>obvious</a:t>
-            </a:r>
-            <a:r>
-              <a:rPr lang="pl-PL" dirty="0" smtClean="0"/>
-              <a:t> </a:t>
-            </a:r>
-            <a:r>
-              <a:rPr lang="pl-PL" dirty="0" err="1" smtClean="0"/>
-              <a:t>algorithmic</a:t>
-            </a:r>
-            <a:r>
-              <a:rPr lang="pl-PL" dirty="0" smtClean="0"/>
-              <a:t> </a:t>
-            </a:r>
-            <a:r>
-              <a:rPr lang="pl-PL" dirty="0" err="1" smtClean="0"/>
-              <a:t>solution</a:t>
-            </a:r>
-            <a:endParaRPr lang="pl-PL" dirty="0" smtClean="0"/>
-          </a:p>
-          <a:p>
-            <a:r>
-              <a:rPr lang="pl-PL" dirty="0" smtClean="0"/>
-              <a:t>The </a:t>
-            </a:r>
-            <a:r>
-              <a:rPr lang="pl-PL" dirty="0" err="1" smtClean="0"/>
-              <a:t>logic</a:t>
-            </a:r>
-            <a:r>
-              <a:rPr lang="pl-PL" dirty="0" smtClean="0"/>
-              <a:t> </a:t>
-            </a:r>
-            <a:r>
-              <a:rPr lang="pl-PL" dirty="0" err="1" smtClean="0"/>
-              <a:t>changes</a:t>
-            </a:r>
-            <a:r>
-              <a:rPr lang="pl-PL" dirty="0" smtClean="0"/>
-              <a:t> </a:t>
-            </a:r>
-            <a:r>
-              <a:rPr lang="pl-PL" dirty="0" err="1" smtClean="0"/>
-              <a:t>often</a:t>
-            </a:r>
-            <a:endParaRPr lang="pl-PL" dirty="0" smtClean="0"/>
-          </a:p>
-          <a:p>
-            <a:r>
-              <a:rPr lang="pl-PL" dirty="0" err="1" smtClean="0"/>
-              <a:t>Domain</a:t>
-            </a:r>
-            <a:r>
-              <a:rPr lang="pl-PL" dirty="0" smtClean="0"/>
-              <a:t> </a:t>
-            </a:r>
-            <a:r>
-              <a:rPr lang="pl-PL" dirty="0" err="1" smtClean="0"/>
-              <a:t>experts</a:t>
-            </a:r>
-            <a:r>
-              <a:rPr lang="pl-PL" dirty="0" smtClean="0"/>
-              <a:t> </a:t>
-            </a:r>
-            <a:r>
-              <a:rPr lang="pl-PL" dirty="0" err="1" smtClean="0"/>
-              <a:t>are</a:t>
-            </a:r>
-            <a:r>
-              <a:rPr lang="pl-PL" dirty="0" smtClean="0"/>
-              <a:t> </a:t>
-            </a:r>
-            <a:r>
-              <a:rPr lang="pl-PL" dirty="0" err="1" smtClean="0"/>
-              <a:t>readily</a:t>
-            </a:r>
-            <a:r>
-              <a:rPr lang="pl-PL" dirty="0" smtClean="0"/>
-              <a:t> </a:t>
-            </a:r>
-            <a:r>
-              <a:rPr lang="pl-PL" dirty="0" err="1" smtClean="0"/>
-              <a:t>available</a:t>
-            </a:r>
-            <a:r>
-              <a:rPr lang="pl-PL" dirty="0" smtClean="0"/>
-              <a:t> and </a:t>
-            </a:r>
-            <a:r>
-              <a:rPr lang="pl-PL" dirty="0" err="1" smtClean="0"/>
-              <a:t>nontechnical</a:t>
-            </a:r>
-            <a:endParaRPr lang="pl-PL" dirty="0"/>
-          </a:p>
-        </p:txBody>
-      </p:sp>
-      <p:sp>
-        <p:nvSpPr>
-          <p:cNvPr id="6" name="Symbol zastępczy zawartości 5"/>
-          <p:cNvSpPr>
-            <a:spLocks noGrp="1"/>
-          </p:cNvSpPr>
-          <p:nvPr>
-            <p:ph sz="quarter" idx="4"/>
-          </p:nvPr>
-        </p:nvSpPr>
-        <p:spPr/>
-        <p:txBody>
-          <a:bodyPr>
-            <a:normAutofit fontScale="92500" lnSpcReduction="20000"/>
-          </a:bodyPr>
-          <a:lstStyle/>
-          <a:p>
-            <a:r>
-              <a:rPr lang="en-US" dirty="0"/>
-              <a:t>Rules engines are not really intended to handle workflow or process executions nor are workflow engines or process management tools designed to do rules. Use the right tool for the job. Sure, a pair of pliers can be used as a hammering tool in a pinch, but that's not what it's designed for.</a:t>
-            </a:r>
-            <a:endParaRPr lang="pl-PL" dirty="0"/>
-          </a:p>
-        </p:txBody>
-      </p:sp>
+      <p:pic>
+        <p:nvPicPr>
+          <p:cNvPr id="5122" name="Picture 2"/>
+          <p:cNvPicPr>
+            <a:picLocks noChangeAspect="1" noChangeArrowheads="1"/>
+          </p:cNvPicPr>
+          <p:nvPr/>
+        </p:nvPicPr>
+        <p:blipFill>
+          <a:blip r:embed="rId2">
+            <a:extLst>
+              <a:ext uri="{28A0092B-C50C-407E-A947-70E740481C1C}">
+                <a14:useLocalDpi xmlns:a14="http://schemas.microsoft.com/office/drawing/2010/main" val="0"/>
+              </a:ext>
+            </a:extLst>
+          </a:blip>
+          <a:srcRect/>
+          <a:stretch>
+            <a:fillRect/>
+          </a:stretch>
+        </p:blipFill>
+        <p:spPr bwMode="auto">
+          <a:xfrm>
+            <a:off x="613404" y="2416324"/>
+            <a:ext cx="7882304" cy="1440160"/>
+          </a:xfrm>
+          <a:prstGeom prst="rect">
+            <a:avLst/>
+          </a:prstGeom>
+          <a:noFill/>
+          <a:ln>
+            <a:noFill/>
+          </a:ln>
+          <a:extLst>
+            <a:ext uri="{909E8E84-426E-40DD-AFC4-6F175D3DCCD1}">
+              <a14:hiddenFill xmlns:a14="http://schemas.microsoft.com/office/drawing/2010/main">
+                <a:solidFill>
+                  <a:schemeClr val="accent1"/>
+                </a:solidFill>
+              </a14:hiddenFill>
+            </a:ext>
+            <a:ext uri="{91240B29-F687-4F45-9708-019B960494DF}">
+              <a14:hiddenLine xmlns:a14="http://schemas.microsoft.com/office/drawing/2010/main" w="9525">
+                <a:solidFill>
+                  <a:schemeClr val="tx1"/>
+                </a:solidFill>
+                <a:miter lim="800000"/>
+                <a:headEnd/>
+                <a:tailEnd/>
+              </a14:hiddenLine>
+            </a:ext>
+          </a:extLst>
+        </p:spPr>
+      </p:pic>
     </p:spTree>
     <p:extLst>
       <p:ext uri="{BB962C8B-B14F-4D97-AF65-F5344CB8AC3E}">
-        <p14:creationId xmlns:p14="http://schemas.microsoft.com/office/powerpoint/2010/main" val="3001520462"/>
+        <p14:creationId xmlns:p14="http://schemas.microsoft.com/office/powerpoint/2010/main" val="1952145853"/>
       </p:ext>
     </p:extLst>
   </p:cSld>
@@ -10110,7 +9202,7 @@
       </p:grpSpPr>
       <p:sp>
         <p:nvSpPr>
-          <p:cNvPr id="2" name="Tytuł 1"/>
+          <p:cNvPr id="3" name="Tytuł 2"/>
           <p:cNvSpPr>
             <a:spLocks noGrp="1"/>
           </p:cNvSpPr>
@@ -10118,170 +9210,95 @@
             <p:ph type="title"/>
           </p:nvPr>
         </p:nvSpPr>
-        <p:spPr>
-          <a:xfrm>
-            <a:off x="827584" y="4077072"/>
-            <a:ext cx="7481776" cy="457200"/>
-          </a:xfrm>
-        </p:spPr>
-        <p:txBody>
-          <a:bodyPr/>
-          <a:lstStyle/>
-          <a:p>
-            <a:r>
-              <a:rPr lang="en-GB" sz="3200" dirty="0" err="1"/>
-              <a:t>JBoss</a:t>
-            </a:r>
-            <a:r>
-              <a:rPr lang="en-GB" sz="3200" dirty="0"/>
-              <a:t> Drools</a:t>
-            </a:r>
-            <a:br>
-              <a:rPr lang="en-GB" sz="3200" dirty="0"/>
-            </a:br>
-            <a:r>
-              <a:rPr lang="en-GB" sz="2800" dirty="0"/>
-              <a:t>example of expert system,</a:t>
-            </a:r>
-            <a:br>
-              <a:rPr lang="en-GB" sz="2800" dirty="0"/>
-            </a:br>
-            <a:r>
-              <a:rPr lang="en-GB" sz="2800" dirty="0"/>
-              <a:t>or develop your own </a:t>
-            </a:r>
-            <a:br>
-              <a:rPr lang="en-GB" sz="2800" dirty="0"/>
-            </a:br>
-            <a:r>
-              <a:rPr lang="en-GB" sz="2800" dirty="0"/>
-              <a:t>House, M.D.</a:t>
-            </a:r>
-            <a:endParaRPr lang="pl-PL" dirty="0"/>
-          </a:p>
-        </p:txBody>
-      </p:sp>
-      <p:sp>
-        <p:nvSpPr>
-          <p:cNvPr id="3" name="Symbol zastępczy tekstu 2"/>
-          <p:cNvSpPr>
-            <a:spLocks noGrp="1"/>
-          </p:cNvSpPr>
-          <p:nvPr>
-            <p:ph type="body" idx="2"/>
-          </p:nvPr>
-        </p:nvSpPr>
-        <p:spPr>
-          <a:xfrm>
-            <a:off x="4427984" y="5877272"/>
-            <a:ext cx="3974592" cy="399256"/>
-          </a:xfrm>
-        </p:spPr>
+        <p:spPr/>
         <p:txBody>
           <a:bodyPr>
-            <a:normAutofit/>
+            <a:normAutofit fontScale="90000"/>
           </a:bodyPr>
           <a:lstStyle/>
           <a:p>
             <a:r>
-              <a:rPr lang="pl-PL" sz="1100" dirty="0" smtClean="0"/>
-              <a:t>by Przemek Różycki</a:t>
-            </a:r>
-            <a:endParaRPr lang="pl-PL" sz="1100" dirty="0"/>
-          </a:p>
-        </p:txBody>
-      </p:sp>
-      <p:sp>
-        <p:nvSpPr>
-          <p:cNvPr id="4" name="Symbol zastępczy zawartości 3"/>
-          <p:cNvSpPr>
-            <a:spLocks noGrp="1"/>
-          </p:cNvSpPr>
-          <p:nvPr>
-            <p:ph sz="half" idx="1"/>
-          </p:nvPr>
-        </p:nvSpPr>
-        <p:spPr/>
-        <p:txBody>
-          <a:bodyPr/>
-          <a:lstStyle/>
-          <a:p>
-            <a:pPr marL="109728" indent="0" algn="ctr">
-              <a:buNone/>
-            </a:pPr>
-            <a:endParaRPr lang="pl-PL" sz="4000" b="1" dirty="0" smtClean="0"/>
-          </a:p>
-          <a:p>
-            <a:pPr marL="109728" indent="0" algn="ctr">
-              <a:buNone/>
-            </a:pPr>
-            <a:r>
-              <a:rPr lang="pl-PL" sz="4000" b="1" dirty="0" err="1" smtClean="0"/>
-              <a:t>Thank</a:t>
-            </a:r>
-            <a:r>
-              <a:rPr lang="pl-PL" sz="4000" b="1" dirty="0" smtClean="0"/>
+              <a:rPr lang="pl-PL" dirty="0" err="1" smtClean="0"/>
+              <a:t>Persistence</a:t>
+            </a:r>
+            <a:r>
+              <a:rPr lang="pl-PL" dirty="0" smtClean="0"/>
               <a:t> </a:t>
             </a:r>
             <a:r>
-              <a:rPr lang="pl-PL" sz="4000" b="1" dirty="0" err="1" smtClean="0"/>
-              <a:t>you</a:t>
-            </a:r>
-            <a:r>
-              <a:rPr lang="pl-PL" sz="4000" b="1" dirty="0" smtClean="0"/>
-              <a:t> for </a:t>
-            </a:r>
-            <a:r>
-              <a:rPr lang="pl-PL" sz="4000" b="1" dirty="0" err="1" smtClean="0"/>
-              <a:t>your</a:t>
-            </a:r>
-            <a:r>
-              <a:rPr lang="pl-PL" sz="4000" b="1" dirty="0" smtClean="0"/>
+              <a:rPr lang="pl-PL" dirty="0" err="1" smtClean="0"/>
+              <a:t>framework</a:t>
+            </a:r>
+            <a:r>
+              <a:rPr lang="pl-PL" dirty="0" smtClean="0"/>
               <a:t> </a:t>
             </a:r>
             <a:r>
-              <a:rPr lang="pl-PL" sz="4000" b="1" dirty="0" err="1" smtClean="0"/>
-              <a:t>attention</a:t>
-            </a:r>
-            <a:r>
-              <a:rPr lang="pl-PL" sz="4000" b="1" dirty="0" smtClean="0"/>
-              <a:t>!</a:t>
-            </a:r>
-          </a:p>
-          <a:p>
-            <a:pPr marL="109728" indent="0" algn="ctr">
-              <a:buNone/>
-            </a:pPr>
-            <a:endParaRPr lang="pl-PL" sz="4000" b="1" dirty="0"/>
-          </a:p>
-          <a:p>
-            <a:pPr marL="109728" indent="0" algn="ctr">
-              <a:buNone/>
-            </a:pPr>
-            <a:r>
-              <a:rPr lang="pl-PL" sz="4000" b="1" dirty="0" err="1" smtClean="0"/>
-              <a:t>Any</a:t>
-            </a:r>
-            <a:r>
-              <a:rPr lang="pl-PL" sz="4000" b="1" dirty="0" smtClean="0"/>
-              <a:t> </a:t>
-            </a:r>
-            <a:r>
-              <a:rPr lang="pl-PL" sz="4000" b="1" dirty="0" err="1" smtClean="0"/>
-              <a:t>questions</a:t>
-            </a:r>
-            <a:r>
-              <a:rPr lang="pl-PL" sz="4000" b="1" dirty="0" smtClean="0"/>
-              <a:t>?</a:t>
-            </a:r>
-            <a:endParaRPr lang="pl-PL" sz="4000" b="1" dirty="0"/>
-          </a:p>
-        </p:txBody>
-      </p:sp>
+              <a:rPr lang="pl-PL" dirty="0" err="1" smtClean="0"/>
+              <a:t>integration</a:t>
+            </a:r>
+            <a:endParaRPr lang="pl-PL" dirty="0"/>
+          </a:p>
+        </p:txBody>
+      </p:sp>
+      <p:pic>
+        <p:nvPicPr>
+          <p:cNvPr id="4098" name="Picture 2"/>
+          <p:cNvPicPr>
+            <a:picLocks noChangeAspect="1" noChangeArrowheads="1"/>
+          </p:cNvPicPr>
+          <p:nvPr/>
+        </p:nvPicPr>
+        <p:blipFill>
+          <a:blip r:embed="rId2">
+            <a:extLst>
+              <a:ext uri="{28A0092B-C50C-407E-A947-70E740481C1C}">
+                <a14:useLocalDpi xmlns:a14="http://schemas.microsoft.com/office/drawing/2010/main" val="0"/>
+              </a:ext>
+            </a:extLst>
+          </a:blip>
+          <a:srcRect/>
+          <a:stretch>
+            <a:fillRect/>
+          </a:stretch>
+        </p:blipFill>
+        <p:spPr bwMode="auto">
+          <a:xfrm>
+            <a:off x="755576" y="1340768"/>
+            <a:ext cx="7565883" cy="4464496"/>
+          </a:xfrm>
+          <a:prstGeom prst="rect">
+            <a:avLst/>
+          </a:prstGeom>
+          <a:noFill/>
+          <a:ln>
+            <a:noFill/>
+          </a:ln>
+          <a:extLst>
+            <a:ext uri="{909E8E84-426E-40DD-AFC4-6F175D3DCCD1}">
+              <a14:hiddenFill xmlns:a14="http://schemas.microsoft.com/office/drawing/2010/main">
+                <a:solidFill>
+                  <a:schemeClr val="accent1"/>
+                </a:solidFill>
+              </a14:hiddenFill>
+            </a:ext>
+            <a:ext uri="{91240B29-F687-4F45-9708-019B960494DF}">
+              <a14:hiddenLine xmlns:a14="http://schemas.microsoft.com/office/drawing/2010/main" w="9525">
+                <a:solidFill>
+                  <a:schemeClr val="tx1"/>
+                </a:solidFill>
+                <a:miter lim="800000"/>
+                <a:headEnd/>
+                <a:tailEnd/>
+              </a14:hiddenLine>
+            </a:ext>
+          </a:extLst>
+        </p:spPr>
+      </p:pic>
     </p:spTree>
     <p:extLst>
       <p:ext uri="{BB962C8B-B14F-4D97-AF65-F5344CB8AC3E}">
-        <p14:creationId xmlns:p14="http://schemas.microsoft.com/office/powerpoint/2010/main" val="3732025211"/>
+        <p14:creationId xmlns:p14="http://schemas.microsoft.com/office/powerpoint/2010/main" val="1896570916"/>
       </p:ext>
     </p:extLst>
   </p:cSld>
@@ -10317,12 +9334,12 @@
       </p:grpSpPr>
       <p:sp>
         <p:nvSpPr>
-          <p:cNvPr id="2" name="Tytuł 1"/>
-          <p:cNvSpPr>
-            <a:spLocks noGrp="1"/>
-          </p:cNvSpPr>
-          <p:nvPr>
-            <p:ph type="title"/>
+          <p:cNvPr id="2" name="Symbol zastępczy zawartości 1"/>
+          <p:cNvSpPr>
+            <a:spLocks noGrp="1"/>
+          </p:cNvSpPr>
+          <p:nvPr>
+            <p:ph idx="1"/>
           </p:nvPr>
         </p:nvSpPr>
         <p:spPr/>
@@ -10331,25 +9348,113 @@
           <a:lstStyle/>
           <a:p>
             <a:r>
-              <a:rPr lang="pl-PL" dirty="0" smtClean="0"/>
-              <a:t>Links and </a:t>
-            </a:r>
-            <a:r>
-              <a:rPr lang="pl-PL" dirty="0" err="1" smtClean="0"/>
-              <a:t>references</a:t>
-            </a:r>
-            <a:endParaRPr lang="en-GB" dirty="0"/>
-          </a:p>
-        </p:txBody>
-      </p:sp>
-      <p:sp>
-        <p:nvSpPr>
-          <p:cNvPr id="3" name="Symbol zastępczy tekstu 2"/>
-          <p:cNvSpPr>
-            <a:spLocks noGrp="1"/>
-          </p:cNvSpPr>
-          <p:nvPr>
-            <p:ph type="body" idx="2"/>
+              <a:rPr lang="pl-PL" dirty="0" err="1" smtClean="0"/>
+              <a:t>Declarative</a:t>
+            </a:r>
+            <a:r>
+              <a:rPr lang="pl-PL" dirty="0" smtClean="0"/>
+              <a:t> </a:t>
+            </a:r>
+            <a:r>
+              <a:rPr lang="pl-PL" dirty="0" err="1" smtClean="0"/>
+              <a:t>programming</a:t>
+            </a:r>
+            <a:endParaRPr lang="pl-PL" dirty="0" smtClean="0"/>
+          </a:p>
+          <a:p>
+            <a:r>
+              <a:rPr lang="pl-PL" dirty="0" err="1" smtClean="0"/>
+              <a:t>Logic</a:t>
+            </a:r>
+            <a:r>
+              <a:rPr lang="pl-PL" dirty="0" smtClean="0"/>
+              <a:t> and data </a:t>
+            </a:r>
+            <a:r>
+              <a:rPr lang="pl-PL" dirty="0" err="1" smtClean="0"/>
+              <a:t>separation</a:t>
+            </a:r>
+            <a:endParaRPr lang="pl-PL" dirty="0" smtClean="0"/>
+          </a:p>
+          <a:p>
+            <a:r>
+              <a:rPr lang="pl-PL" dirty="0" err="1" smtClean="0"/>
+              <a:t>Speed</a:t>
+            </a:r>
+            <a:r>
+              <a:rPr lang="pl-PL" dirty="0" smtClean="0"/>
+              <a:t> and </a:t>
+            </a:r>
+            <a:r>
+              <a:rPr lang="pl-PL" dirty="0" err="1" smtClean="0"/>
+              <a:t>Scalability</a:t>
+            </a:r>
+            <a:endParaRPr lang="pl-PL" dirty="0" smtClean="0"/>
+          </a:p>
+          <a:p>
+            <a:r>
+              <a:rPr lang="pl-PL" dirty="0" err="1" smtClean="0"/>
+              <a:t>Centralization</a:t>
+            </a:r>
+            <a:r>
+              <a:rPr lang="pl-PL" dirty="0" smtClean="0"/>
+              <a:t> of Knowledge</a:t>
+            </a:r>
+          </a:p>
+          <a:p>
+            <a:r>
+              <a:rPr lang="pl-PL" dirty="0" err="1" smtClean="0"/>
+              <a:t>Tool</a:t>
+            </a:r>
+            <a:r>
+              <a:rPr lang="pl-PL" dirty="0"/>
+              <a:t> </a:t>
+            </a:r>
+            <a:r>
+              <a:rPr lang="pl-PL" dirty="0" smtClean="0"/>
+              <a:t>Integration</a:t>
+            </a:r>
+          </a:p>
+          <a:p>
+            <a:r>
+              <a:rPr lang="pl-PL" dirty="0" err="1" smtClean="0"/>
+              <a:t>Explanation</a:t>
+            </a:r>
+            <a:r>
+              <a:rPr lang="pl-PL" dirty="0" smtClean="0"/>
+              <a:t> </a:t>
+            </a:r>
+            <a:r>
+              <a:rPr lang="pl-PL" dirty="0" err="1" smtClean="0"/>
+              <a:t>facility</a:t>
+            </a:r>
+            <a:endParaRPr lang="pl-PL" dirty="0" smtClean="0"/>
+          </a:p>
+          <a:p>
+            <a:r>
+              <a:rPr lang="pl-PL" dirty="0" err="1" smtClean="0"/>
+              <a:t>Understandable</a:t>
+            </a:r>
+            <a:r>
+              <a:rPr lang="pl-PL" dirty="0" smtClean="0"/>
+              <a:t> </a:t>
+            </a:r>
+            <a:r>
+              <a:rPr lang="pl-PL" dirty="0" err="1" smtClean="0"/>
+              <a:t>rules</a:t>
+            </a:r>
+            <a:endParaRPr lang="pl-PL" dirty="0"/>
+          </a:p>
+        </p:txBody>
+      </p:sp>
+      <p:sp>
+        <p:nvSpPr>
+          <p:cNvPr id="3" name="Tytuł 2"/>
+          <p:cNvSpPr>
+            <a:spLocks noGrp="1"/>
+          </p:cNvSpPr>
+          <p:nvPr>
+            <p:ph type="title"/>
           </p:nvPr>
         </p:nvSpPr>
         <p:spPr/>
@@ -10358,182 +9463,33 @@
           <a:lstStyle/>
           <a:p>
             <a:r>
-              <a:rPr lang="pl-PL" dirty="0" smtClean="0"/>
-              <a:t>by Przemek Różycki</a:t>
-            </a:r>
-            <a:endParaRPr lang="en-GB" dirty="0"/>
-          </a:p>
-        </p:txBody>
-      </p:sp>
-      <p:sp>
-        <p:nvSpPr>
-          <p:cNvPr id="4" name="Symbol zastępczy zawartości 3"/>
-          <p:cNvSpPr>
-            <a:spLocks noGrp="1"/>
-          </p:cNvSpPr>
-          <p:nvPr>
-            <p:ph sz="half" idx="1"/>
-          </p:nvPr>
-        </p:nvSpPr>
-        <p:spPr/>
-        <p:txBody>
-          <a:bodyPr>
-            <a:normAutofit/>
-          </a:bodyPr>
-          <a:lstStyle/>
-          <a:p>
-            <a:r>
-              <a:rPr lang="pl-PL" sz="2800" dirty="0" err="1" smtClean="0"/>
-              <a:t>This</a:t>
-            </a:r>
-            <a:r>
-              <a:rPr lang="pl-PL" sz="2800" dirty="0" smtClean="0"/>
+              <a:rPr lang="pl-PL" dirty="0" err="1" smtClean="0"/>
+              <a:t>Adventages</a:t>
+            </a:r>
+            <a:r>
+              <a:rPr lang="pl-PL" dirty="0" smtClean="0"/>
+              <a:t> of </a:t>
+            </a:r>
+            <a:r>
+              <a:rPr lang="pl-PL" dirty="0" err="1" smtClean="0"/>
+              <a:t>rule</a:t>
+            </a:r>
+            <a:r>
+              <a:rPr lang="pl-PL" dirty="0" smtClean="0"/>
               <a:t> </a:t>
             </a:r>
             <a:r>
-              <a:rPr lang="pl-PL" sz="2800" dirty="0" err="1" smtClean="0"/>
-              <a:t>presentation</a:t>
-            </a:r>
-            <a:r>
-              <a:rPr lang="pl-PL" sz="2800" dirty="0" smtClean="0"/>
-              <a:t> and </a:t>
-            </a:r>
-            <a:r>
-              <a:rPr lang="pl-PL" sz="2800" dirty="0" err="1" smtClean="0"/>
-              <a:t>examples</a:t>
-            </a:r>
-            <a:endParaRPr lang="pl-PL" sz="2800" dirty="0" smtClean="0"/>
-          </a:p>
-          <a:p>
-            <a:pPr lvl="1"/>
-            <a:r>
-              <a:rPr lang="en-GB" sz="2000" dirty="0" smtClean="0">
-                <a:hlinkClick r:id="rId2"/>
-              </a:rPr>
-              <a:t>https</a:t>
-            </a:r>
-            <a:r>
-              <a:rPr lang="en-GB" sz="2000" dirty="0">
-                <a:hlinkClick r:id="rId2"/>
-              </a:rPr>
-              <a:t>://</a:t>
-            </a:r>
-            <a:r>
-              <a:rPr lang="en-GB" sz="2000" dirty="0" smtClean="0">
-                <a:hlinkClick r:id="rId2"/>
-              </a:rPr>
-              <a:t>github.com/rozz/drools-presentation-and-examples/tree/master-drools-6-jug</a:t>
-            </a:r>
-            <a:endParaRPr lang="pl-PL" sz="2000" dirty="0" smtClean="0"/>
-          </a:p>
-          <a:p>
-            <a:r>
-              <a:rPr lang="pl-PL" sz="2800" dirty="0" err="1" smtClean="0"/>
-              <a:t>Drools</a:t>
-            </a:r>
-            <a:r>
-              <a:rPr lang="pl-PL" sz="2800" dirty="0" smtClean="0"/>
-              <a:t> </a:t>
-            </a:r>
-            <a:r>
-              <a:rPr lang="pl-PL" sz="2800" dirty="0" err="1" smtClean="0"/>
-              <a:t>documentation</a:t>
-            </a:r>
-            <a:endParaRPr lang="pl-PL" sz="2800" dirty="0" smtClean="0"/>
-          </a:p>
-          <a:p>
-            <a:pPr lvl="1"/>
-            <a:r>
-              <a:rPr lang="en-GB" sz="2000" dirty="0" smtClean="0">
-                <a:hlinkClick r:id="rId3"/>
-              </a:rPr>
-              <a:t>http</a:t>
-            </a:r>
-            <a:r>
-              <a:rPr lang="en-GB" sz="2000" dirty="0">
-                <a:hlinkClick r:id="rId3"/>
-              </a:rPr>
-              <a:t>://</a:t>
-            </a:r>
-            <a:r>
-              <a:rPr lang="en-GB" sz="2000" dirty="0" smtClean="0">
-                <a:hlinkClick r:id="rId3"/>
-              </a:rPr>
-              <a:t>www.jboss.org/drools/documentation</a:t>
-            </a:r>
-            <a:endParaRPr lang="pl-PL" sz="2000" dirty="0" smtClean="0"/>
-          </a:p>
-          <a:p>
-            <a:pPr lvl="1"/>
-            <a:r>
-              <a:rPr lang="en-GB" sz="2000" dirty="0" smtClean="0">
-                <a:hlinkClick r:id="rId4"/>
-              </a:rPr>
-              <a:t>https</a:t>
-            </a:r>
-            <a:r>
-              <a:rPr lang="en-GB" sz="2000" dirty="0">
-                <a:hlinkClick r:id="rId4"/>
-              </a:rPr>
-              <a:t>://</a:t>
-            </a:r>
-            <a:r>
-              <a:rPr lang="en-GB" sz="2000" dirty="0" smtClean="0">
-                <a:hlinkClick r:id="rId4"/>
-              </a:rPr>
-              <a:t>community.jboss.org/wiki/JBossRules</a:t>
-            </a:r>
-            <a:endParaRPr lang="pl-PL" sz="2000" dirty="0" smtClean="0"/>
-          </a:p>
-          <a:p>
-            <a:r>
-              <a:rPr lang="pl-PL" sz="2800" dirty="0" smtClean="0"/>
-              <a:t>Komercyjne </a:t>
-            </a:r>
-            <a:r>
-              <a:rPr lang="pl-PL" sz="2800" dirty="0" err="1" smtClean="0"/>
-              <a:t>Droolsy</a:t>
-            </a:r>
-            <a:r>
-              <a:rPr lang="pl-PL" sz="2800" dirty="0" smtClean="0"/>
-              <a:t> </a:t>
-            </a:r>
-            <a:r>
-              <a:rPr lang="pl-PL" sz="2800" dirty="0" err="1" smtClean="0"/>
-              <a:t>RedHata</a:t>
-            </a:r>
-            <a:endParaRPr lang="pl-PL" sz="2800" dirty="0" smtClean="0">
-              <a:hlinkClick r:id="rId5"/>
-            </a:endParaRPr>
-          </a:p>
-          <a:p>
-            <a:pPr lvl="1"/>
-            <a:r>
-              <a:rPr lang="en-GB" sz="2000" dirty="0" smtClean="0">
-                <a:hlinkClick r:id="rId5"/>
-              </a:rPr>
-              <a:t>http</a:t>
-            </a:r>
-            <a:r>
-              <a:rPr lang="en-GB" sz="2000" dirty="0">
-                <a:hlinkClick r:id="rId5"/>
-              </a:rPr>
-              <a:t>://www.redhat.com/products/jbossenterprisemiddleware/business-rules</a:t>
-            </a:r>
-            <a:r>
-              <a:rPr lang="en-GB" sz="2000" dirty="0" smtClean="0">
-                <a:hlinkClick r:id="rId5"/>
-              </a:rPr>
-              <a:t>/</a:t>
-            </a:r>
-            <a:endParaRPr lang="pl-PL" sz="2000" dirty="0" smtClean="0"/>
+              <a:rPr lang="pl-PL" dirty="0" err="1" smtClean="0"/>
+              <a:t>engine</a:t>
+            </a:r>
+            <a:endParaRPr lang="pl-PL" dirty="0"/>
           </a:p>
         </p:txBody>
       </p:sp>
     </p:spTree>
     <p:extLst>
       <p:ext uri="{BB962C8B-B14F-4D97-AF65-F5344CB8AC3E}">
-        <p14:creationId xmlns:p14="http://schemas.microsoft.com/office/powerpoint/2010/main" val="823432182"/>
+        <p14:creationId xmlns:p14="http://schemas.microsoft.com/office/powerpoint/2010/main" val="3095177641"/>
       </p:ext>
     </p:extLst>
   </p:cSld>
@@ -10586,19 +9542,15 @@
           <a:p>
             <a:r>
               <a:rPr lang="pl-PL" dirty="0" smtClean="0"/>
-              <a:t>Knowledge </a:t>
-            </a:r>
-            <a:r>
-              <a:rPr lang="pl-PL" dirty="0" err="1" smtClean="0"/>
-              <a:t>Representation</a:t>
+              <a:t>KRR </a:t>
             </a:r>
             <a:r>
               <a:rPr lang="en-US" dirty="0" smtClean="0"/>
-              <a:t> </a:t>
+              <a:t>is </a:t>
             </a:r>
             <a:r>
               <a:rPr lang="en-US" dirty="0"/>
-              <a:t>is about how we represent our knowledge in symbolic form, i.e. how we describe something. </a:t>
+              <a:t>about how we represent our knowledge in symbolic form, i.e. how we describe something. </a:t>
             </a:r>
             <a:endParaRPr lang="pl-PL" dirty="0" smtClean="0"/>
           </a:p>
@@ -10828,6 +9780,793 @@
     <p:extLst>
       <p:ext uri="{BB962C8B-B14F-4D97-AF65-F5344CB8AC3E}">
         <p14:creationId xmlns:p14="http://schemas.microsoft.com/office/powerpoint/2010/main" val="4230564183"/>
+      </p:ext>
+    </p:extLst>
+  </p:cSld>
+  <p:clrMapOvr>
+    <a:masterClrMapping/>
+  </p:clrMapOvr>
+  <p:timing>
+    <p:tnLst>
+      <p:par>
+        <p:cTn id="1" dur="indefinite" restart="never" nodeType="tmRoot"/>
+      </p:par>
+    </p:tnLst>
+  </p:timing>
+</p:sld>
+</file>
+
+<file path=ppt/slides/slide30.xml><?xml version="1.0" encoding="utf-8"?>
+<p:sld xmlns:a="http://schemas.openxmlformats.org/drawingml/2006/main" xmlns:r="http://schemas.openxmlformats.org/officeDocument/2006/relationships" xmlns:p="http://schemas.openxmlformats.org/presentationml/2006/main">
+  <p:cSld>
+    <p:spTree>
+      <p:nvGrpSpPr>
+        <p:cNvPr id="1" name=""/>
+        <p:cNvGrpSpPr/>
+        <p:nvPr/>
+      </p:nvGrpSpPr>
+      <p:grpSpPr>
+        <a:xfrm>
+          <a:off x="0" y="0"/>
+          <a:ext cx="0" cy="0"/>
+          <a:chOff x="0" y="0"/>
+          <a:chExt cx="0" cy="0"/>
+        </a:xfrm>
+      </p:grpSpPr>
+      <p:sp>
+        <p:nvSpPr>
+          <p:cNvPr id="2" name="Tytuł 1"/>
+          <p:cNvSpPr>
+            <a:spLocks noGrp="1"/>
+          </p:cNvSpPr>
+          <p:nvPr>
+            <p:ph type="title"/>
+          </p:nvPr>
+        </p:nvSpPr>
+        <p:spPr/>
+        <p:txBody>
+          <a:bodyPr/>
+          <a:lstStyle/>
+          <a:p>
+            <a:r>
+              <a:rPr lang="pl-PL" dirty="0" err="1"/>
+              <a:t>When</a:t>
+            </a:r>
+            <a:r>
+              <a:rPr lang="pl-PL" dirty="0"/>
+              <a:t> to </a:t>
+            </a:r>
+            <a:r>
+              <a:rPr lang="pl-PL" dirty="0" err="1"/>
+              <a:t>use</a:t>
+            </a:r>
+            <a:r>
+              <a:rPr lang="pl-PL" dirty="0"/>
+              <a:t>, </a:t>
+            </a:r>
+            <a:r>
+              <a:rPr lang="pl-PL" dirty="0" err="1"/>
+              <a:t>when</a:t>
+            </a:r>
+            <a:r>
+              <a:rPr lang="pl-PL" dirty="0"/>
+              <a:t> not to</a:t>
+            </a:r>
+          </a:p>
+        </p:txBody>
+      </p:sp>
+      <p:sp>
+        <p:nvSpPr>
+          <p:cNvPr id="3" name="Symbol zastępczy tekstu 2"/>
+          <p:cNvSpPr>
+            <a:spLocks noGrp="1"/>
+          </p:cNvSpPr>
+          <p:nvPr>
+            <p:ph type="body" idx="1"/>
+          </p:nvPr>
+        </p:nvSpPr>
+        <p:spPr/>
+        <p:txBody>
+          <a:bodyPr/>
+          <a:lstStyle/>
+          <a:p>
+            <a:endParaRPr lang="pl-PL" dirty="0"/>
+          </a:p>
+        </p:txBody>
+      </p:sp>
+      <p:sp>
+        <p:nvSpPr>
+          <p:cNvPr id="4" name="Symbol zastępczy tekstu 3"/>
+          <p:cNvSpPr>
+            <a:spLocks noGrp="1"/>
+          </p:cNvSpPr>
+          <p:nvPr>
+            <p:ph type="body" sz="half" idx="3"/>
+          </p:nvPr>
+        </p:nvSpPr>
+        <p:spPr/>
+        <p:txBody>
+          <a:bodyPr/>
+          <a:lstStyle/>
+          <a:p>
+            <a:endParaRPr lang="pl-PL"/>
+          </a:p>
+        </p:txBody>
+      </p:sp>
+      <p:sp>
+        <p:nvSpPr>
+          <p:cNvPr id="5" name="Symbol zastępczy zawartości 4"/>
+          <p:cNvSpPr>
+            <a:spLocks noGrp="1"/>
+          </p:cNvSpPr>
+          <p:nvPr>
+            <p:ph sz="quarter" idx="2"/>
+          </p:nvPr>
+        </p:nvSpPr>
+        <p:spPr/>
+        <p:txBody>
+          <a:bodyPr>
+            <a:normAutofit lnSpcReduction="10000"/>
+          </a:bodyPr>
+          <a:lstStyle/>
+          <a:p>
+            <a:r>
+              <a:rPr lang="pl-PL" dirty="0" smtClean="0"/>
+              <a:t>The problem </a:t>
+            </a:r>
+            <a:r>
+              <a:rPr lang="pl-PL" dirty="0" err="1" smtClean="0"/>
+              <a:t>is</a:t>
+            </a:r>
+            <a:r>
+              <a:rPr lang="pl-PL" dirty="0" smtClean="0"/>
+              <a:t> </a:t>
+            </a:r>
+            <a:r>
+              <a:rPr lang="pl-PL" dirty="0" err="1" smtClean="0"/>
+              <a:t>too</a:t>
+            </a:r>
+            <a:r>
+              <a:rPr lang="pl-PL" dirty="0" smtClean="0"/>
+              <a:t> </a:t>
+            </a:r>
+            <a:r>
+              <a:rPr lang="pl-PL" dirty="0" err="1" smtClean="0"/>
+              <a:t>fiddly</a:t>
+            </a:r>
+            <a:r>
+              <a:rPr lang="pl-PL" dirty="0" smtClean="0"/>
+              <a:t> for </a:t>
+            </a:r>
+            <a:r>
+              <a:rPr lang="pl-PL" dirty="0" err="1" smtClean="0"/>
+              <a:t>traditional</a:t>
+            </a:r>
+            <a:r>
+              <a:rPr lang="pl-PL" dirty="0" smtClean="0"/>
+              <a:t> </a:t>
+            </a:r>
+            <a:r>
+              <a:rPr lang="pl-PL" dirty="0" err="1" smtClean="0"/>
+              <a:t>code</a:t>
+            </a:r>
+            <a:endParaRPr lang="pl-PL" dirty="0" smtClean="0"/>
+          </a:p>
+          <a:p>
+            <a:r>
+              <a:rPr lang="pl-PL" dirty="0" smtClean="0"/>
+              <a:t>The problem </a:t>
+            </a:r>
+            <a:r>
+              <a:rPr lang="pl-PL" dirty="0" err="1" smtClean="0"/>
+              <a:t>is</a:t>
+            </a:r>
+            <a:r>
+              <a:rPr lang="pl-PL" dirty="0" smtClean="0"/>
+              <a:t> </a:t>
+            </a:r>
+            <a:r>
+              <a:rPr lang="pl-PL" dirty="0" err="1" smtClean="0"/>
+              <a:t>beyond</a:t>
+            </a:r>
+            <a:r>
+              <a:rPr lang="pl-PL" dirty="0" smtClean="0"/>
+              <a:t> </a:t>
+            </a:r>
+            <a:r>
+              <a:rPr lang="pl-PL" dirty="0" err="1" smtClean="0"/>
+              <a:t>any</a:t>
+            </a:r>
+            <a:r>
+              <a:rPr lang="pl-PL" dirty="0" smtClean="0"/>
+              <a:t> </a:t>
+            </a:r>
+            <a:r>
+              <a:rPr lang="pl-PL" dirty="0" err="1" smtClean="0"/>
+              <a:t>obvious</a:t>
+            </a:r>
+            <a:r>
+              <a:rPr lang="pl-PL" dirty="0" smtClean="0"/>
+              <a:t> </a:t>
+            </a:r>
+            <a:r>
+              <a:rPr lang="pl-PL" dirty="0" err="1" smtClean="0"/>
+              <a:t>algorithmic</a:t>
+            </a:r>
+            <a:r>
+              <a:rPr lang="pl-PL" dirty="0" smtClean="0"/>
+              <a:t> </a:t>
+            </a:r>
+            <a:r>
+              <a:rPr lang="pl-PL" dirty="0" err="1" smtClean="0"/>
+              <a:t>solution</a:t>
+            </a:r>
+            <a:endParaRPr lang="pl-PL" dirty="0" smtClean="0"/>
+          </a:p>
+          <a:p>
+            <a:r>
+              <a:rPr lang="pl-PL" dirty="0" smtClean="0"/>
+              <a:t>The </a:t>
+            </a:r>
+            <a:r>
+              <a:rPr lang="pl-PL" dirty="0" err="1" smtClean="0"/>
+              <a:t>logic</a:t>
+            </a:r>
+            <a:r>
+              <a:rPr lang="pl-PL" dirty="0" smtClean="0"/>
+              <a:t> </a:t>
+            </a:r>
+            <a:r>
+              <a:rPr lang="pl-PL" dirty="0" err="1" smtClean="0"/>
+              <a:t>changes</a:t>
+            </a:r>
+            <a:r>
+              <a:rPr lang="pl-PL" dirty="0" smtClean="0"/>
+              <a:t> </a:t>
+            </a:r>
+            <a:r>
+              <a:rPr lang="pl-PL" dirty="0" err="1" smtClean="0"/>
+              <a:t>often</a:t>
+            </a:r>
+            <a:endParaRPr lang="pl-PL" dirty="0" smtClean="0"/>
+          </a:p>
+          <a:p>
+            <a:r>
+              <a:rPr lang="pl-PL" dirty="0" err="1" smtClean="0"/>
+              <a:t>Domain</a:t>
+            </a:r>
+            <a:r>
+              <a:rPr lang="pl-PL" dirty="0" smtClean="0"/>
+              <a:t> </a:t>
+            </a:r>
+            <a:r>
+              <a:rPr lang="pl-PL" dirty="0" err="1" smtClean="0"/>
+              <a:t>experts</a:t>
+            </a:r>
+            <a:r>
+              <a:rPr lang="pl-PL" dirty="0" smtClean="0"/>
+              <a:t> </a:t>
+            </a:r>
+            <a:r>
+              <a:rPr lang="pl-PL" dirty="0" err="1" smtClean="0"/>
+              <a:t>are</a:t>
+            </a:r>
+            <a:r>
+              <a:rPr lang="pl-PL" dirty="0" smtClean="0"/>
+              <a:t> </a:t>
+            </a:r>
+            <a:r>
+              <a:rPr lang="pl-PL" dirty="0" err="1" smtClean="0"/>
+              <a:t>readily</a:t>
+            </a:r>
+            <a:r>
+              <a:rPr lang="pl-PL" dirty="0" smtClean="0"/>
+              <a:t> </a:t>
+            </a:r>
+            <a:r>
+              <a:rPr lang="pl-PL" dirty="0" err="1" smtClean="0"/>
+              <a:t>available</a:t>
+            </a:r>
+            <a:r>
+              <a:rPr lang="pl-PL" dirty="0" smtClean="0"/>
+              <a:t> and </a:t>
+            </a:r>
+            <a:r>
+              <a:rPr lang="pl-PL" dirty="0" err="1" smtClean="0"/>
+              <a:t>nontechnical</a:t>
+            </a:r>
+            <a:endParaRPr lang="pl-PL" dirty="0"/>
+          </a:p>
+        </p:txBody>
+      </p:sp>
+      <p:sp>
+        <p:nvSpPr>
+          <p:cNvPr id="6" name="Symbol zastępczy zawartości 5"/>
+          <p:cNvSpPr>
+            <a:spLocks noGrp="1"/>
+          </p:cNvSpPr>
+          <p:nvPr>
+            <p:ph sz="quarter" idx="4"/>
+          </p:nvPr>
+        </p:nvSpPr>
+        <p:spPr/>
+        <p:txBody>
+          <a:bodyPr>
+            <a:normAutofit fontScale="92500" lnSpcReduction="20000"/>
+          </a:bodyPr>
+          <a:lstStyle/>
+          <a:p>
+            <a:r>
+              <a:rPr lang="en-US" dirty="0"/>
+              <a:t>Rules engines are not really intended to handle workflow or process executions nor are workflow engines or process management tools designed to do rules. Use the right tool for the job. Sure, a pair of pliers can be used as a hammering tool in a pinch, but that's not what it's designed for.</a:t>
+            </a:r>
+            <a:endParaRPr lang="pl-PL" dirty="0"/>
+          </a:p>
+        </p:txBody>
+      </p:sp>
+    </p:spTree>
+    <p:extLst>
+      <p:ext uri="{BB962C8B-B14F-4D97-AF65-F5344CB8AC3E}">
+        <p14:creationId xmlns:p14="http://schemas.microsoft.com/office/powerpoint/2010/main" val="3001520462"/>
+      </p:ext>
+    </p:extLst>
+  </p:cSld>
+  <p:clrMapOvr>
+    <a:masterClrMapping/>
+  </p:clrMapOvr>
+  <p:timing>
+    <p:tnLst>
+      <p:par>
+        <p:cTn id="1" dur="indefinite" restart="never" nodeType="tmRoot"/>
+      </p:par>
+    </p:tnLst>
+  </p:timing>
+</p:sld>
+</file>
+
+<file path=ppt/slides/slide31.xml><?xml version="1.0" encoding="utf-8"?>
+<p:sld xmlns:a="http://schemas.openxmlformats.org/drawingml/2006/main" xmlns:r="http://schemas.openxmlformats.org/officeDocument/2006/relationships" xmlns:p="http://schemas.openxmlformats.org/presentationml/2006/main">
+  <p:cSld>
+    <p:spTree>
+      <p:nvGrpSpPr>
+        <p:cNvPr id="1" name=""/>
+        <p:cNvGrpSpPr/>
+        <p:nvPr/>
+      </p:nvGrpSpPr>
+      <p:grpSpPr>
+        <a:xfrm>
+          <a:off x="0" y="0"/>
+          <a:ext cx="0" cy="0"/>
+          <a:chOff x="0" y="0"/>
+          <a:chExt cx="0" cy="0"/>
+        </a:xfrm>
+      </p:grpSpPr>
+      <p:sp>
+        <p:nvSpPr>
+          <p:cNvPr id="2" name="Tytuł 1"/>
+          <p:cNvSpPr>
+            <a:spLocks noGrp="1"/>
+          </p:cNvSpPr>
+          <p:nvPr>
+            <p:ph type="title"/>
+          </p:nvPr>
+        </p:nvSpPr>
+        <p:spPr>
+          <a:xfrm>
+            <a:off x="827584" y="4077072"/>
+            <a:ext cx="7481776" cy="457200"/>
+          </a:xfrm>
+        </p:spPr>
+        <p:txBody>
+          <a:bodyPr/>
+          <a:lstStyle/>
+          <a:p>
+            <a:r>
+              <a:rPr lang="en-GB" sz="3200" dirty="0" err="1"/>
+              <a:t>JBoss</a:t>
+            </a:r>
+            <a:r>
+              <a:rPr lang="en-GB" sz="3200" dirty="0"/>
+              <a:t> Drools</a:t>
+            </a:r>
+            <a:br>
+              <a:rPr lang="en-GB" sz="3200" dirty="0"/>
+            </a:br>
+            <a:r>
+              <a:rPr lang="en-GB" sz="2800" dirty="0"/>
+              <a:t>example of expert system,</a:t>
+            </a:r>
+            <a:br>
+              <a:rPr lang="en-GB" sz="2800" dirty="0"/>
+            </a:br>
+            <a:r>
+              <a:rPr lang="en-GB" sz="2800" dirty="0"/>
+              <a:t>or develop your own </a:t>
+            </a:r>
+            <a:br>
+              <a:rPr lang="en-GB" sz="2800" dirty="0"/>
+            </a:br>
+            <a:r>
+              <a:rPr lang="en-GB" sz="2800" dirty="0"/>
+              <a:t>House, M.D.</a:t>
+            </a:r>
+            <a:endParaRPr lang="pl-PL" dirty="0"/>
+          </a:p>
+        </p:txBody>
+      </p:sp>
+      <p:sp>
+        <p:nvSpPr>
+          <p:cNvPr id="3" name="Symbol zastępczy tekstu 2"/>
+          <p:cNvSpPr>
+            <a:spLocks noGrp="1"/>
+          </p:cNvSpPr>
+          <p:nvPr>
+            <p:ph type="body" idx="2"/>
+          </p:nvPr>
+        </p:nvSpPr>
+        <p:spPr>
+          <a:xfrm>
+            <a:off x="4427984" y="5877272"/>
+            <a:ext cx="3974592" cy="399256"/>
+          </a:xfrm>
+        </p:spPr>
+        <p:txBody>
+          <a:bodyPr>
+            <a:normAutofit/>
+          </a:bodyPr>
+          <a:lstStyle/>
+          <a:p>
+            <a:r>
+              <a:rPr lang="pl-PL" sz="1100" dirty="0" smtClean="0"/>
+              <a:t>by Przemek Różycki</a:t>
+            </a:r>
+            <a:endParaRPr lang="pl-PL" sz="1100" dirty="0"/>
+          </a:p>
+        </p:txBody>
+      </p:sp>
+      <p:sp>
+        <p:nvSpPr>
+          <p:cNvPr id="4" name="Symbol zastępczy zawartości 3"/>
+          <p:cNvSpPr>
+            <a:spLocks noGrp="1"/>
+          </p:cNvSpPr>
+          <p:nvPr>
+            <p:ph sz="half" idx="1"/>
+          </p:nvPr>
+        </p:nvSpPr>
+        <p:spPr/>
+        <p:txBody>
+          <a:bodyPr/>
+          <a:lstStyle/>
+          <a:p>
+            <a:pPr marL="109728" indent="0" algn="ctr">
+              <a:buNone/>
+            </a:pPr>
+            <a:endParaRPr lang="pl-PL" sz="4000" b="1" dirty="0" smtClean="0"/>
+          </a:p>
+          <a:p>
+            <a:pPr marL="109728" indent="0" algn="ctr">
+              <a:buNone/>
+            </a:pPr>
+            <a:r>
+              <a:rPr lang="pl-PL" sz="4000" b="1" dirty="0" err="1" smtClean="0"/>
+              <a:t>Thank</a:t>
+            </a:r>
+            <a:r>
+              <a:rPr lang="pl-PL" sz="4000" b="1" dirty="0" smtClean="0"/>
+              <a:t> </a:t>
+            </a:r>
+            <a:r>
+              <a:rPr lang="pl-PL" sz="4000" b="1" dirty="0" err="1" smtClean="0"/>
+              <a:t>you</a:t>
+            </a:r>
+            <a:r>
+              <a:rPr lang="pl-PL" sz="4000" b="1" dirty="0" smtClean="0"/>
+              <a:t> for </a:t>
+            </a:r>
+            <a:r>
+              <a:rPr lang="pl-PL" sz="4000" b="1" dirty="0" err="1" smtClean="0"/>
+              <a:t>your</a:t>
+            </a:r>
+            <a:r>
+              <a:rPr lang="pl-PL" sz="4000" b="1" dirty="0" smtClean="0"/>
+              <a:t> </a:t>
+            </a:r>
+            <a:r>
+              <a:rPr lang="pl-PL" sz="4000" b="1" dirty="0" err="1" smtClean="0"/>
+              <a:t>attention</a:t>
+            </a:r>
+            <a:r>
+              <a:rPr lang="pl-PL" sz="4000" b="1" dirty="0" smtClean="0"/>
+              <a:t>!</a:t>
+            </a:r>
+          </a:p>
+          <a:p>
+            <a:pPr marL="109728" indent="0" algn="ctr">
+              <a:buNone/>
+            </a:pPr>
+            <a:endParaRPr lang="pl-PL" sz="4000" b="1" dirty="0"/>
+          </a:p>
+          <a:p>
+            <a:pPr marL="109728" indent="0" algn="ctr">
+              <a:buNone/>
+            </a:pPr>
+            <a:r>
+              <a:rPr lang="pl-PL" sz="4000" b="1" dirty="0" err="1" smtClean="0"/>
+              <a:t>Any</a:t>
+            </a:r>
+            <a:r>
+              <a:rPr lang="pl-PL" sz="4000" b="1" dirty="0" smtClean="0"/>
+              <a:t> </a:t>
+            </a:r>
+            <a:r>
+              <a:rPr lang="pl-PL" sz="4000" b="1" dirty="0" err="1" smtClean="0"/>
+              <a:t>questions</a:t>
+            </a:r>
+            <a:r>
+              <a:rPr lang="pl-PL" sz="4000" b="1" dirty="0" smtClean="0"/>
+              <a:t>?</a:t>
+            </a:r>
+            <a:endParaRPr lang="pl-PL" sz="4000" b="1" dirty="0"/>
+          </a:p>
+        </p:txBody>
+      </p:sp>
+    </p:spTree>
+    <p:extLst>
+      <p:ext uri="{BB962C8B-B14F-4D97-AF65-F5344CB8AC3E}">
+        <p14:creationId xmlns:p14="http://schemas.microsoft.com/office/powerpoint/2010/main" val="3732025211"/>
+      </p:ext>
+    </p:extLst>
+  </p:cSld>
+  <p:clrMapOvr>
+    <a:masterClrMapping/>
+  </p:clrMapOvr>
+  <p:timing>
+    <p:tnLst>
+      <p:par>
+        <p:cTn id="1" dur="indefinite" restart="never" nodeType="tmRoot"/>
+      </p:par>
+    </p:tnLst>
+  </p:timing>
+</p:sld>
+</file>
+
+<file path=ppt/slides/slide32.xml><?xml version="1.0" encoding="utf-8"?>
+<p:sld xmlns:a="http://schemas.openxmlformats.org/drawingml/2006/main" xmlns:r="http://schemas.openxmlformats.org/officeDocument/2006/relationships" xmlns:p="http://schemas.openxmlformats.org/presentationml/2006/main">
+  <p:cSld>
+    <p:spTree>
+      <p:nvGrpSpPr>
+        <p:cNvPr id="1" name=""/>
+        <p:cNvGrpSpPr/>
+        <p:nvPr/>
+      </p:nvGrpSpPr>
+      <p:grpSpPr>
+        <a:xfrm>
+          <a:off x="0" y="0"/>
+          <a:ext cx="0" cy="0"/>
+          <a:chOff x="0" y="0"/>
+          <a:chExt cx="0" cy="0"/>
+        </a:xfrm>
+      </p:grpSpPr>
+      <p:sp>
+        <p:nvSpPr>
+          <p:cNvPr id="2" name="Tytuł 1"/>
+          <p:cNvSpPr>
+            <a:spLocks noGrp="1"/>
+          </p:cNvSpPr>
+          <p:nvPr>
+            <p:ph type="title"/>
+          </p:nvPr>
+        </p:nvSpPr>
+        <p:spPr/>
+        <p:txBody>
+          <a:bodyPr/>
+          <a:lstStyle/>
+          <a:p>
+            <a:r>
+              <a:rPr lang="pl-PL" dirty="0" smtClean="0"/>
+              <a:t>Links and </a:t>
+            </a:r>
+            <a:r>
+              <a:rPr lang="pl-PL" dirty="0" err="1" smtClean="0"/>
+              <a:t>references</a:t>
+            </a:r>
+            <a:endParaRPr lang="en-GB" dirty="0"/>
+          </a:p>
+        </p:txBody>
+      </p:sp>
+      <p:sp>
+        <p:nvSpPr>
+          <p:cNvPr id="3" name="Symbol zastępczy tekstu 2"/>
+          <p:cNvSpPr>
+            <a:spLocks noGrp="1"/>
+          </p:cNvSpPr>
+          <p:nvPr>
+            <p:ph type="body" idx="2"/>
+          </p:nvPr>
+        </p:nvSpPr>
+        <p:spPr/>
+        <p:txBody>
+          <a:bodyPr/>
+          <a:lstStyle/>
+          <a:p>
+            <a:r>
+              <a:rPr lang="pl-PL" dirty="0" smtClean="0"/>
+              <a:t>by Przemek Różycki</a:t>
+            </a:r>
+            <a:endParaRPr lang="en-GB" dirty="0"/>
+          </a:p>
+        </p:txBody>
+      </p:sp>
+      <p:sp>
+        <p:nvSpPr>
+          <p:cNvPr id="4" name="Symbol zastępczy zawartości 3"/>
+          <p:cNvSpPr>
+            <a:spLocks noGrp="1"/>
+          </p:cNvSpPr>
+          <p:nvPr>
+            <p:ph sz="half" idx="1"/>
+          </p:nvPr>
+        </p:nvSpPr>
+        <p:spPr/>
+        <p:txBody>
+          <a:bodyPr>
+            <a:normAutofit/>
+          </a:bodyPr>
+          <a:lstStyle/>
+          <a:p>
+            <a:r>
+              <a:rPr lang="pl-PL" sz="2800" dirty="0" err="1" smtClean="0"/>
+              <a:t>This</a:t>
+            </a:r>
+            <a:r>
+              <a:rPr lang="pl-PL" sz="2800" dirty="0" smtClean="0"/>
+              <a:t> </a:t>
+            </a:r>
+            <a:r>
+              <a:rPr lang="pl-PL" sz="2800" dirty="0" err="1" smtClean="0"/>
+              <a:t>presentation</a:t>
+            </a:r>
+            <a:r>
+              <a:rPr lang="pl-PL" sz="2800" dirty="0" smtClean="0"/>
+              <a:t> and </a:t>
+            </a:r>
+            <a:r>
+              <a:rPr lang="pl-PL" sz="2800" dirty="0" err="1" smtClean="0"/>
+              <a:t>examples</a:t>
+            </a:r>
+            <a:endParaRPr lang="pl-PL" sz="2800" dirty="0" smtClean="0"/>
+          </a:p>
+          <a:p>
+            <a:pPr lvl="1"/>
+            <a:r>
+              <a:rPr lang="en-GB" sz="2000" dirty="0" smtClean="0">
+                <a:hlinkClick r:id="rId2"/>
+              </a:rPr>
+              <a:t>https</a:t>
+            </a:r>
+            <a:r>
+              <a:rPr lang="en-GB" sz="2000" dirty="0">
+                <a:hlinkClick r:id="rId2"/>
+              </a:rPr>
+              <a:t>://</a:t>
+            </a:r>
+            <a:r>
+              <a:rPr lang="en-GB" sz="2000" dirty="0" smtClean="0">
+                <a:hlinkClick r:id="rId2"/>
+              </a:rPr>
+              <a:t>github.com/rozz/drools-presentation-and-examples/tree/master-drools-6-jug</a:t>
+            </a:r>
+            <a:endParaRPr lang="pl-PL" sz="2000" dirty="0" smtClean="0"/>
+          </a:p>
+          <a:p>
+            <a:r>
+              <a:rPr lang="pl-PL" sz="2800" dirty="0" err="1" smtClean="0"/>
+              <a:t>Drools</a:t>
+            </a:r>
+            <a:r>
+              <a:rPr lang="pl-PL" sz="2800" dirty="0" smtClean="0"/>
+              <a:t> </a:t>
+            </a:r>
+            <a:r>
+              <a:rPr lang="pl-PL" sz="2800" dirty="0" err="1" smtClean="0"/>
+              <a:t>documentation</a:t>
+            </a:r>
+            <a:endParaRPr lang="pl-PL" sz="2800" dirty="0" smtClean="0"/>
+          </a:p>
+          <a:p>
+            <a:pPr lvl="1"/>
+            <a:r>
+              <a:rPr lang="en-GB" sz="2000" dirty="0" smtClean="0">
+                <a:hlinkClick r:id="rId3"/>
+              </a:rPr>
+              <a:t>http</a:t>
+            </a:r>
+            <a:r>
+              <a:rPr lang="en-GB" sz="2000" dirty="0">
+                <a:hlinkClick r:id="rId3"/>
+              </a:rPr>
+              <a:t>://</a:t>
+            </a:r>
+            <a:r>
+              <a:rPr lang="en-GB" sz="2000" dirty="0" smtClean="0">
+                <a:hlinkClick r:id="rId3"/>
+              </a:rPr>
+              <a:t>www.jboss.org/drools/documentation</a:t>
+            </a:r>
+            <a:endParaRPr lang="pl-PL" sz="2000" dirty="0" smtClean="0"/>
+          </a:p>
+          <a:p>
+            <a:pPr lvl="1"/>
+            <a:r>
+              <a:rPr lang="en-GB" sz="2000" dirty="0" smtClean="0">
+                <a:hlinkClick r:id="rId4"/>
+              </a:rPr>
+              <a:t>https</a:t>
+            </a:r>
+            <a:r>
+              <a:rPr lang="en-GB" sz="2000" dirty="0">
+                <a:hlinkClick r:id="rId4"/>
+              </a:rPr>
+              <a:t>://</a:t>
+            </a:r>
+            <a:r>
+              <a:rPr lang="en-GB" sz="2000" dirty="0" smtClean="0">
+                <a:hlinkClick r:id="rId4"/>
+              </a:rPr>
+              <a:t>community.jboss.org/wiki/JBossRules</a:t>
+            </a:r>
+            <a:endParaRPr lang="pl-PL" sz="2000" dirty="0" smtClean="0"/>
+          </a:p>
+          <a:p>
+            <a:r>
+              <a:rPr lang="pl-PL" sz="2800" dirty="0" smtClean="0"/>
+              <a:t>Komercyjne </a:t>
+            </a:r>
+            <a:r>
+              <a:rPr lang="pl-PL" sz="2800" dirty="0" err="1" smtClean="0"/>
+              <a:t>Droolsy</a:t>
+            </a:r>
+            <a:r>
+              <a:rPr lang="pl-PL" sz="2800" dirty="0" smtClean="0"/>
+              <a:t> </a:t>
+            </a:r>
+            <a:r>
+              <a:rPr lang="pl-PL" sz="2800" dirty="0" err="1" smtClean="0"/>
+              <a:t>RedHata</a:t>
+            </a:r>
+            <a:endParaRPr lang="pl-PL" sz="2800" dirty="0" smtClean="0">
+              <a:hlinkClick r:id="rId5"/>
+            </a:endParaRPr>
+          </a:p>
+          <a:p>
+            <a:pPr lvl="1"/>
+            <a:r>
+              <a:rPr lang="en-GB" sz="2000" dirty="0" smtClean="0">
+                <a:hlinkClick r:id="rId5"/>
+              </a:rPr>
+              <a:t>http</a:t>
+            </a:r>
+            <a:r>
+              <a:rPr lang="en-GB" sz="2000" dirty="0">
+                <a:hlinkClick r:id="rId5"/>
+              </a:rPr>
+              <a:t>://www.redhat.com/products/jbossenterprisemiddleware/business-rules</a:t>
+            </a:r>
+            <a:r>
+              <a:rPr lang="en-GB" sz="2000" dirty="0" smtClean="0">
+                <a:hlinkClick r:id="rId5"/>
+              </a:rPr>
+              <a:t>/</a:t>
+            </a:r>
+            <a:endParaRPr lang="pl-PL" sz="2000" dirty="0" smtClean="0"/>
+          </a:p>
+        </p:txBody>
+      </p:sp>
+    </p:spTree>
+    <p:extLst>
+      <p:ext uri="{BB962C8B-B14F-4D97-AF65-F5344CB8AC3E}">
+        <p14:creationId xmlns:p14="http://schemas.microsoft.com/office/powerpoint/2010/main" val="823432182"/>
       </p:ext>
     </p:extLst>
   </p:cSld>

</xml_diff>